<commit_message>
Finished readme and updated ERD
</commit_message>
<xml_diff>
--- a/Presentation.pptx
+++ b/Presentation.pptx
@@ -5,11 +5,12 @@
     <p:sldMasterId id="2147483660" r:id="rId4"/>
   </p:sldMasterIdLst>
   <p:notesMasterIdLst>
-    <p:notesMasterId r:id="rId7"/>
+    <p:notesMasterId r:id="rId8"/>
   </p:notesMasterIdLst>
   <p:sldIdLst>
     <p:sldId id="264" r:id="rId5"/>
-    <p:sldId id="312" r:id="rId6"/>
+    <p:sldId id="265" r:id="rId6"/>
+    <p:sldId id="266" r:id="rId7"/>
   </p:sldIdLst>
   <p:sldSz cx="12192000" cy="6858000"/>
   <p:notesSz cx="6858000" cy="9144000"/>
@@ -114,3006 +115,6 @@
     </p:ext>
   </p:extLst>
 </p:presentation>
-</file>
-
-<file path=ppt/diagrams/colors1.xml><?xml version="1.0" encoding="utf-8"?>
-<dgm:colorsDef xmlns:dgm="http://schemas.openxmlformats.org/drawingml/2006/diagram" xmlns:a="http://schemas.openxmlformats.org/drawingml/2006/main" uniqueId="urn:microsoft.com/office/officeart/2018/5/colors/Iconchunking_neutralicon_colorful1">
-  <dgm:title val=""/>
-  <dgm:desc val=""/>
-  <dgm:catLst>
-    <dgm:cat type="colorful" pri="10100"/>
-  </dgm:catLst>
-  <dgm:styleLbl name="node0">
-    <dgm:fillClrLst meth="repeat">
-      <a:schemeClr val="accent1"/>
-    </dgm:fillClrLst>
-    <dgm:linClrLst meth="repeat">
-      <a:schemeClr val="lt1"/>
-    </dgm:linClrLst>
-    <dgm:effectClrLst/>
-    <dgm:txLinClrLst/>
-    <dgm:txFillClrLst/>
-    <dgm:txEffectClrLst/>
-  </dgm:styleLbl>
-  <dgm:styleLbl name="node1">
-    <dgm:fillClrLst meth="repeat">
-      <a:schemeClr val="bg1"/>
-    </dgm:fillClrLst>
-    <dgm:linClrLst meth="repeat">
-      <a:schemeClr val="lt1">
-        <a:alpha val="0"/>
-      </a:schemeClr>
-    </dgm:linClrLst>
-    <dgm:effectClrLst/>
-    <dgm:txLinClrLst/>
-    <dgm:txFillClrLst meth="repeat">
-      <a:schemeClr val="dk1"/>
-    </dgm:txFillClrLst>
-    <dgm:txEffectClrLst/>
-  </dgm:styleLbl>
-  <dgm:styleLbl name="alignNode1">
-    <dgm:fillClrLst meth="repeat">
-      <a:schemeClr val="accent2"/>
-      <a:schemeClr val="accent3"/>
-      <a:schemeClr val="accent4"/>
-      <a:schemeClr val="accent5"/>
-      <a:schemeClr val="accent6"/>
-    </dgm:fillClrLst>
-    <dgm:linClrLst meth="repeat">
-      <a:schemeClr val="accent2"/>
-      <a:schemeClr val="accent3"/>
-      <a:schemeClr val="accent4"/>
-      <a:schemeClr val="accent5"/>
-      <a:schemeClr val="accent6"/>
-    </dgm:linClrLst>
-    <dgm:effectClrLst/>
-    <dgm:txLinClrLst/>
-    <dgm:txFillClrLst/>
-    <dgm:txEffectClrLst/>
-  </dgm:styleLbl>
-  <dgm:styleLbl name="lnNode1">
-    <dgm:fillClrLst meth="repeat">
-      <a:schemeClr val="accent2"/>
-      <a:schemeClr val="accent3"/>
-      <a:schemeClr val="accent4"/>
-      <a:schemeClr val="accent5"/>
-      <a:schemeClr val="accent6"/>
-    </dgm:fillClrLst>
-    <dgm:linClrLst meth="repeat">
-      <a:schemeClr val="lt1"/>
-    </dgm:linClrLst>
-    <dgm:effectClrLst/>
-    <dgm:txLinClrLst/>
-    <dgm:txFillClrLst/>
-    <dgm:txEffectClrLst/>
-  </dgm:styleLbl>
-  <dgm:styleLbl name="vennNode1">
-    <dgm:fillClrLst meth="repeat">
-      <a:schemeClr val="accent2">
-        <a:alpha val="50000"/>
-      </a:schemeClr>
-      <a:schemeClr val="accent3">
-        <a:alpha val="50000"/>
-      </a:schemeClr>
-      <a:schemeClr val="accent4">
-        <a:alpha val="50000"/>
-      </a:schemeClr>
-      <a:schemeClr val="accent5">
-        <a:alpha val="50000"/>
-      </a:schemeClr>
-      <a:schemeClr val="accent6">
-        <a:alpha val="50000"/>
-      </a:schemeClr>
-    </dgm:fillClrLst>
-    <dgm:linClrLst meth="repeat">
-      <a:schemeClr val="lt1"/>
-    </dgm:linClrLst>
-    <dgm:effectClrLst/>
-    <dgm:txLinClrLst/>
-    <dgm:txFillClrLst/>
-    <dgm:txEffectClrLst/>
-  </dgm:styleLbl>
-  <dgm:styleLbl name="node2">
-    <dgm:fillClrLst>
-      <a:schemeClr val="accent2"/>
-    </dgm:fillClrLst>
-    <dgm:linClrLst meth="repeat">
-      <a:schemeClr val="lt1"/>
-    </dgm:linClrLst>
-    <dgm:effectClrLst/>
-    <dgm:txLinClrLst/>
-    <dgm:txFillClrLst/>
-    <dgm:txEffectClrLst/>
-  </dgm:styleLbl>
-  <dgm:styleLbl name="node3">
-    <dgm:fillClrLst>
-      <a:schemeClr val="accent3"/>
-    </dgm:fillClrLst>
-    <dgm:linClrLst meth="repeat">
-      <a:schemeClr val="lt1"/>
-    </dgm:linClrLst>
-    <dgm:effectClrLst/>
-    <dgm:txLinClrLst/>
-    <dgm:txFillClrLst/>
-    <dgm:txEffectClrLst/>
-  </dgm:styleLbl>
-  <dgm:styleLbl name="node4">
-    <dgm:fillClrLst>
-      <a:schemeClr val="accent4"/>
-    </dgm:fillClrLst>
-    <dgm:linClrLst meth="repeat">
-      <a:schemeClr val="lt1"/>
-    </dgm:linClrLst>
-    <dgm:effectClrLst/>
-    <dgm:txLinClrLst/>
-    <dgm:txFillClrLst/>
-    <dgm:txEffectClrLst/>
-  </dgm:styleLbl>
-  <dgm:styleLbl name="fgImgPlace1">
-    <dgm:fillClrLst meth="repeat">
-      <a:schemeClr val="accent2">
-        <a:tint val="50000"/>
-      </a:schemeClr>
-      <a:schemeClr val="accent3">
-        <a:tint val="50000"/>
-      </a:schemeClr>
-      <a:schemeClr val="accent4">
-        <a:tint val="50000"/>
-      </a:schemeClr>
-      <a:schemeClr val="accent5">
-        <a:tint val="50000"/>
-      </a:schemeClr>
-      <a:schemeClr val="accent6">
-        <a:tint val="50000"/>
-      </a:schemeClr>
-    </dgm:fillClrLst>
-    <dgm:linClrLst meth="repeat">
-      <a:schemeClr val="lt1"/>
-    </dgm:linClrLst>
-    <dgm:effectClrLst/>
-    <dgm:txLinClrLst/>
-    <dgm:txFillClrLst meth="repeat">
-      <a:schemeClr val="lt1"/>
-    </dgm:txFillClrLst>
-    <dgm:txEffectClrLst/>
-  </dgm:styleLbl>
-  <dgm:styleLbl name="alignImgPlace1">
-    <dgm:fillClrLst>
-      <a:schemeClr val="accent1">
-        <a:tint val="50000"/>
-      </a:schemeClr>
-      <a:schemeClr val="accent2">
-        <a:tint val="20000"/>
-      </a:schemeClr>
-    </dgm:fillClrLst>
-    <dgm:linClrLst meth="repeat">
-      <a:schemeClr val="lt1"/>
-    </dgm:linClrLst>
-    <dgm:effectClrLst/>
-    <dgm:txLinClrLst/>
-    <dgm:txFillClrLst meth="repeat">
-      <a:schemeClr val="lt1"/>
-    </dgm:txFillClrLst>
-    <dgm:txEffectClrLst/>
-  </dgm:styleLbl>
-  <dgm:styleLbl name="bgImgPlace1">
-    <dgm:fillClrLst>
-      <a:schemeClr val="accent1">
-        <a:tint val="50000"/>
-      </a:schemeClr>
-      <a:schemeClr val="accent2">
-        <a:tint val="20000"/>
-      </a:schemeClr>
-    </dgm:fillClrLst>
-    <dgm:linClrLst meth="repeat">
-      <a:schemeClr val="lt1"/>
-    </dgm:linClrLst>
-    <dgm:effectClrLst/>
-    <dgm:txLinClrLst/>
-    <dgm:txFillClrLst meth="repeat">
-      <a:schemeClr val="lt1"/>
-    </dgm:txFillClrLst>
-    <dgm:txEffectClrLst/>
-  </dgm:styleLbl>
-  <dgm:styleLbl name="sibTrans2D1">
-    <dgm:fillClrLst meth="repeat">
-      <a:schemeClr val="accent2"/>
-      <a:schemeClr val="accent3"/>
-      <a:schemeClr val="accent4"/>
-      <a:schemeClr val="accent5"/>
-      <a:schemeClr val="accent6"/>
-    </dgm:fillClrLst>
-    <dgm:linClrLst meth="cycle">
-      <a:schemeClr val="lt1"/>
-    </dgm:linClrLst>
-    <dgm:effectClrLst/>
-    <dgm:txLinClrLst/>
-    <dgm:txFillClrLst/>
-    <dgm:txEffectClrLst/>
-  </dgm:styleLbl>
-  <dgm:styleLbl name="fgSibTrans2D1">
-    <dgm:fillClrLst meth="repeat">
-      <a:schemeClr val="accent2"/>
-      <a:schemeClr val="accent3"/>
-      <a:schemeClr val="accent4"/>
-      <a:schemeClr val="accent5"/>
-      <a:schemeClr val="accent6"/>
-    </dgm:fillClrLst>
-    <dgm:linClrLst meth="cycle">
-      <a:schemeClr val="lt1"/>
-    </dgm:linClrLst>
-    <dgm:effectClrLst/>
-    <dgm:txLinClrLst/>
-    <dgm:txFillClrLst meth="repeat">
-      <a:schemeClr val="lt1"/>
-    </dgm:txFillClrLst>
-    <dgm:txEffectClrLst/>
-  </dgm:styleLbl>
-  <dgm:styleLbl name="bgSibTrans2D1">
-    <dgm:fillClrLst meth="repeat">
-      <a:schemeClr val="accent2"/>
-      <a:schemeClr val="accent3"/>
-      <a:schemeClr val="accent4"/>
-      <a:schemeClr val="accent5"/>
-      <a:schemeClr val="accent6"/>
-    </dgm:fillClrLst>
-    <dgm:linClrLst meth="cycle">
-      <a:schemeClr val="lt1"/>
-    </dgm:linClrLst>
-    <dgm:effectClrLst/>
-    <dgm:txLinClrLst/>
-    <dgm:txFillClrLst meth="repeat">
-      <a:schemeClr val="lt1"/>
-    </dgm:txFillClrLst>
-    <dgm:txEffectClrLst/>
-  </dgm:styleLbl>
-  <dgm:styleLbl name="sibTrans1D1">
-    <dgm:fillClrLst meth="repeat">
-      <a:schemeClr val="accent2"/>
-      <a:schemeClr val="accent3"/>
-      <a:schemeClr val="accent4"/>
-      <a:schemeClr val="accent5"/>
-      <a:schemeClr val="accent6"/>
-    </dgm:fillClrLst>
-    <dgm:linClrLst meth="repeat">
-      <a:schemeClr val="accent2"/>
-      <a:schemeClr val="accent3"/>
-      <a:schemeClr val="accent4"/>
-      <a:schemeClr val="accent5"/>
-      <a:schemeClr val="accent6"/>
-    </dgm:linClrLst>
-    <dgm:effectClrLst/>
-    <dgm:txLinClrLst/>
-    <dgm:txFillClrLst meth="repeat">
-      <a:schemeClr val="tx1"/>
-    </dgm:txFillClrLst>
-    <dgm:txEffectClrLst/>
-  </dgm:styleLbl>
-  <dgm:styleLbl name="callout">
-    <dgm:fillClrLst meth="repeat">
-      <a:schemeClr val="accent2"/>
-    </dgm:fillClrLst>
-    <dgm:linClrLst meth="repeat">
-      <a:schemeClr val="accent2">
-        <a:tint val="50000"/>
-      </a:schemeClr>
-    </dgm:linClrLst>
-    <dgm:effectClrLst/>
-    <dgm:txLinClrLst/>
-    <dgm:txFillClrLst meth="repeat">
-      <a:schemeClr val="tx1"/>
-    </dgm:txFillClrLst>
-    <dgm:txEffectClrLst/>
-  </dgm:styleLbl>
-  <dgm:styleLbl name="asst0">
-    <dgm:fillClrLst meth="repeat">
-      <a:schemeClr val="accent1"/>
-    </dgm:fillClrLst>
-    <dgm:linClrLst meth="repeat">
-      <a:schemeClr val="lt1"/>
-    </dgm:linClrLst>
-    <dgm:effectClrLst/>
-    <dgm:txLinClrLst/>
-    <dgm:txFillClrLst/>
-    <dgm:txEffectClrLst/>
-  </dgm:styleLbl>
-  <dgm:styleLbl name="asst1">
-    <dgm:fillClrLst meth="repeat">
-      <a:schemeClr val="accent2"/>
-    </dgm:fillClrLst>
-    <dgm:linClrLst meth="repeat">
-      <a:schemeClr val="lt1"/>
-    </dgm:linClrLst>
-    <dgm:effectClrLst/>
-    <dgm:txLinClrLst/>
-    <dgm:txFillClrLst/>
-    <dgm:txEffectClrLst/>
-  </dgm:styleLbl>
-  <dgm:styleLbl name="asst2">
-    <dgm:fillClrLst>
-      <a:schemeClr val="accent3"/>
-    </dgm:fillClrLst>
-    <dgm:linClrLst meth="repeat">
-      <a:schemeClr val="lt1"/>
-    </dgm:linClrLst>
-    <dgm:effectClrLst/>
-    <dgm:txLinClrLst/>
-    <dgm:txFillClrLst/>
-    <dgm:txEffectClrLst/>
-  </dgm:styleLbl>
-  <dgm:styleLbl name="asst3">
-    <dgm:fillClrLst>
-      <a:schemeClr val="accent4"/>
-    </dgm:fillClrLst>
-    <dgm:linClrLst meth="repeat">
-      <a:schemeClr val="lt1"/>
-    </dgm:linClrLst>
-    <dgm:effectClrLst/>
-    <dgm:txLinClrLst/>
-    <dgm:txFillClrLst/>
-    <dgm:txEffectClrLst/>
-  </dgm:styleLbl>
-  <dgm:styleLbl name="asst4">
-    <dgm:fillClrLst>
-      <a:schemeClr val="accent5"/>
-    </dgm:fillClrLst>
-    <dgm:linClrLst meth="repeat">
-      <a:schemeClr val="lt1"/>
-    </dgm:linClrLst>
-    <dgm:effectClrLst/>
-    <dgm:txLinClrLst/>
-    <dgm:txFillClrLst/>
-    <dgm:txEffectClrLst/>
-  </dgm:styleLbl>
-  <dgm:styleLbl name="parChTrans2D1">
-    <dgm:fillClrLst meth="repeat">
-      <a:schemeClr val="accent2"/>
-    </dgm:fillClrLst>
-    <dgm:linClrLst meth="repeat">
-      <a:schemeClr val="lt1"/>
-    </dgm:linClrLst>
-    <dgm:effectClrLst/>
-    <dgm:txLinClrLst/>
-    <dgm:txFillClrLst meth="repeat">
-      <a:schemeClr val="lt1"/>
-    </dgm:txFillClrLst>
-    <dgm:txEffectClrLst/>
-  </dgm:styleLbl>
-  <dgm:styleLbl name="parChTrans2D2">
-    <dgm:fillClrLst meth="repeat">
-      <a:schemeClr val="accent3"/>
-    </dgm:fillClrLst>
-    <dgm:linClrLst meth="repeat">
-      <a:schemeClr val="lt1"/>
-    </dgm:linClrLst>
-    <dgm:effectClrLst/>
-    <dgm:txLinClrLst/>
-    <dgm:txFillClrLst/>
-    <dgm:txEffectClrLst/>
-  </dgm:styleLbl>
-  <dgm:styleLbl name="parChTrans2D3">
-    <dgm:fillClrLst meth="repeat">
-      <a:schemeClr val="accent4"/>
-    </dgm:fillClrLst>
-    <dgm:linClrLst meth="repeat">
-      <a:schemeClr val="lt1"/>
-    </dgm:linClrLst>
-    <dgm:effectClrLst/>
-    <dgm:txLinClrLst/>
-    <dgm:txFillClrLst/>
-    <dgm:txEffectClrLst/>
-  </dgm:styleLbl>
-  <dgm:styleLbl name="parChTrans2D4">
-    <dgm:fillClrLst meth="repeat">
-      <a:schemeClr val="accent5"/>
-    </dgm:fillClrLst>
-    <dgm:linClrLst meth="repeat">
-      <a:schemeClr val="lt1"/>
-    </dgm:linClrLst>
-    <dgm:effectClrLst/>
-    <dgm:txLinClrLst/>
-    <dgm:txFillClrLst meth="repeat">
-      <a:schemeClr val="lt1"/>
-    </dgm:txFillClrLst>
-    <dgm:txEffectClrLst/>
-  </dgm:styleLbl>
-  <dgm:styleLbl name="parChTrans1D1">
-    <dgm:fillClrLst meth="repeat">
-      <a:schemeClr val="accent2"/>
-    </dgm:fillClrLst>
-    <dgm:linClrLst meth="repeat">
-      <a:schemeClr val="accent1"/>
-    </dgm:linClrLst>
-    <dgm:effectClrLst/>
-    <dgm:txLinClrLst/>
-    <dgm:txFillClrLst meth="repeat">
-      <a:schemeClr val="tx1"/>
-    </dgm:txFillClrLst>
-    <dgm:txEffectClrLst/>
-  </dgm:styleLbl>
-  <dgm:styleLbl name="parChTrans1D2">
-    <dgm:fillClrLst meth="repeat">
-      <a:schemeClr val="accent3">
-        <a:tint val="90000"/>
-      </a:schemeClr>
-    </dgm:fillClrLst>
-    <dgm:linClrLst meth="repeat">
-      <a:schemeClr val="accent2"/>
-    </dgm:linClrLst>
-    <dgm:effectClrLst/>
-    <dgm:txLinClrLst/>
-    <dgm:txFillClrLst meth="repeat">
-      <a:schemeClr val="tx1"/>
-    </dgm:txFillClrLst>
-    <dgm:txEffectClrLst/>
-  </dgm:styleLbl>
-  <dgm:styleLbl name="parChTrans1D3">
-    <dgm:fillClrLst meth="repeat">
-      <a:schemeClr val="accent4">
-        <a:tint val="70000"/>
-      </a:schemeClr>
-    </dgm:fillClrLst>
-    <dgm:linClrLst meth="repeat">
-      <a:schemeClr val="accent3"/>
-    </dgm:linClrLst>
-    <dgm:effectClrLst/>
-    <dgm:txLinClrLst/>
-    <dgm:txFillClrLst meth="repeat">
-      <a:schemeClr val="tx1"/>
-    </dgm:txFillClrLst>
-    <dgm:txEffectClrLst/>
-  </dgm:styleLbl>
-  <dgm:styleLbl name="parChTrans1D4">
-    <dgm:fillClrLst meth="repeat">
-      <a:schemeClr val="accent5">
-        <a:tint val="50000"/>
-      </a:schemeClr>
-    </dgm:fillClrLst>
-    <dgm:linClrLst meth="repeat">
-      <a:schemeClr val="accent4"/>
-    </dgm:linClrLst>
-    <dgm:effectClrLst/>
-    <dgm:txLinClrLst/>
-    <dgm:txFillClrLst meth="repeat">
-      <a:schemeClr val="tx1"/>
-    </dgm:txFillClrLst>
-    <dgm:txEffectClrLst/>
-  </dgm:styleLbl>
-  <dgm:styleLbl name="fgAcc1">
-    <dgm:fillClrLst meth="repeat">
-      <a:schemeClr val="lt1">
-        <a:alpha val="90000"/>
-      </a:schemeClr>
-    </dgm:fillClrLst>
-    <dgm:linClrLst meth="repeat">
-      <a:schemeClr val="accent2"/>
-      <a:schemeClr val="accent3"/>
-      <a:schemeClr val="accent4"/>
-      <a:schemeClr val="accent5"/>
-      <a:schemeClr val="accent6"/>
-    </dgm:linClrLst>
-    <dgm:effectClrLst/>
-    <dgm:txLinClrLst/>
-    <dgm:txFillClrLst meth="repeat">
-      <a:schemeClr val="dk1"/>
-    </dgm:txFillClrLst>
-    <dgm:txEffectClrLst/>
-  </dgm:styleLbl>
-  <dgm:styleLbl name="conFgAcc1">
-    <dgm:fillClrLst meth="repeat">
-      <a:schemeClr val="lt1">
-        <a:alpha val="90000"/>
-      </a:schemeClr>
-    </dgm:fillClrLst>
-    <dgm:linClrLst meth="repeat">
-      <a:schemeClr val="accent2"/>
-      <a:schemeClr val="accent3"/>
-      <a:schemeClr val="accent4"/>
-      <a:schemeClr val="accent5"/>
-      <a:schemeClr val="accent6"/>
-    </dgm:linClrLst>
-    <dgm:effectClrLst/>
-    <dgm:txLinClrLst/>
-    <dgm:txFillClrLst meth="repeat">
-      <a:schemeClr val="dk1"/>
-    </dgm:txFillClrLst>
-    <dgm:txEffectClrLst/>
-  </dgm:styleLbl>
-  <dgm:styleLbl name="alignAcc1">
-    <dgm:fillClrLst meth="repeat">
-      <a:schemeClr val="lt1">
-        <a:alpha val="90000"/>
-      </a:schemeClr>
-    </dgm:fillClrLst>
-    <dgm:linClrLst meth="repeat">
-      <a:schemeClr val="accent2"/>
-      <a:schemeClr val="accent3"/>
-      <a:schemeClr val="accent4"/>
-      <a:schemeClr val="accent5"/>
-      <a:schemeClr val="accent6"/>
-    </dgm:linClrLst>
-    <dgm:effectClrLst/>
-    <dgm:txLinClrLst/>
-    <dgm:txFillClrLst meth="repeat">
-      <a:schemeClr val="dk1"/>
-    </dgm:txFillClrLst>
-    <dgm:txEffectClrLst/>
-  </dgm:styleLbl>
-  <dgm:styleLbl name="trAlignAcc1">
-    <dgm:fillClrLst meth="repeat">
-      <a:schemeClr val="lt1">
-        <a:alpha val="40000"/>
-      </a:schemeClr>
-    </dgm:fillClrLst>
-    <dgm:linClrLst meth="repeat">
-      <a:schemeClr val="accent1"/>
-    </dgm:linClrLst>
-    <dgm:effectClrLst/>
-    <dgm:txLinClrLst/>
-    <dgm:txFillClrLst meth="repeat">
-      <a:schemeClr val="dk1"/>
-    </dgm:txFillClrLst>
-    <dgm:txEffectClrLst/>
-  </dgm:styleLbl>
-  <dgm:styleLbl name="bgAcc1">
-    <dgm:fillClrLst meth="repeat">
-      <a:schemeClr val="lt1">
-        <a:alpha val="90000"/>
-      </a:schemeClr>
-    </dgm:fillClrLst>
-    <dgm:linClrLst meth="repeat">
-      <a:schemeClr val="accent2"/>
-      <a:schemeClr val="accent3"/>
-      <a:schemeClr val="accent4"/>
-      <a:schemeClr val="accent5"/>
-      <a:schemeClr val="accent6"/>
-    </dgm:linClrLst>
-    <dgm:effectClrLst/>
-    <dgm:txLinClrLst/>
-    <dgm:txFillClrLst meth="repeat">
-      <a:schemeClr val="dk1"/>
-    </dgm:txFillClrLst>
-    <dgm:txEffectClrLst/>
-  </dgm:styleLbl>
-  <dgm:styleLbl name="solidFgAcc1">
-    <dgm:fillClrLst meth="repeat">
-      <a:schemeClr val="lt1"/>
-    </dgm:fillClrLst>
-    <dgm:linClrLst meth="repeat">
-      <a:schemeClr val="accent2"/>
-      <a:schemeClr val="accent3"/>
-      <a:schemeClr val="accent4"/>
-      <a:schemeClr val="accent5"/>
-      <a:schemeClr val="accent6"/>
-    </dgm:linClrLst>
-    <dgm:effectClrLst/>
-    <dgm:txLinClrLst/>
-    <dgm:txFillClrLst meth="repeat">
-      <a:schemeClr val="dk1"/>
-    </dgm:txFillClrLst>
-    <dgm:txEffectClrLst/>
-  </dgm:styleLbl>
-  <dgm:styleLbl name="solidAlignAcc1">
-    <dgm:fillClrLst meth="repeat">
-      <a:schemeClr val="lt1"/>
-    </dgm:fillClrLst>
-    <dgm:linClrLst meth="repeat">
-      <a:schemeClr val="accent2"/>
-      <a:schemeClr val="accent3"/>
-      <a:schemeClr val="accent4"/>
-      <a:schemeClr val="accent5"/>
-      <a:schemeClr val="accent6"/>
-    </dgm:linClrLst>
-    <dgm:effectClrLst/>
-    <dgm:txLinClrLst/>
-    <dgm:txFillClrLst meth="repeat">
-      <a:schemeClr val="dk1"/>
-    </dgm:txFillClrLst>
-    <dgm:txEffectClrLst/>
-  </dgm:styleLbl>
-  <dgm:styleLbl name="solidBgAcc1">
-    <dgm:fillClrLst meth="repeat">
-      <a:schemeClr val="lt1"/>
-    </dgm:fillClrLst>
-    <dgm:linClrLst meth="repeat">
-      <a:schemeClr val="accent2"/>
-      <a:schemeClr val="accent3"/>
-      <a:schemeClr val="accent4"/>
-      <a:schemeClr val="accent5"/>
-      <a:schemeClr val="accent6"/>
-    </dgm:linClrLst>
-    <dgm:effectClrLst/>
-    <dgm:txLinClrLst/>
-    <dgm:txFillClrLst meth="repeat">
-      <a:schemeClr val="dk1"/>
-    </dgm:txFillClrLst>
-    <dgm:txEffectClrLst/>
-  </dgm:styleLbl>
-  <dgm:styleLbl name="fgAccFollowNode1">
-    <dgm:fillClrLst meth="repeat">
-      <a:schemeClr val="accent2">
-        <a:tint val="40000"/>
-        <a:alpha val="90000"/>
-      </a:schemeClr>
-      <a:schemeClr val="accent3">
-        <a:tint val="40000"/>
-        <a:alpha val="90000"/>
-      </a:schemeClr>
-      <a:schemeClr val="accent4">
-        <a:tint val="40000"/>
-        <a:alpha val="90000"/>
-      </a:schemeClr>
-      <a:schemeClr val="accent5">
-        <a:tint val="40000"/>
-        <a:alpha val="90000"/>
-      </a:schemeClr>
-      <a:schemeClr val="accent6">
-        <a:tint val="40000"/>
-        <a:alpha val="90000"/>
-      </a:schemeClr>
-    </dgm:fillClrLst>
-    <dgm:linClrLst meth="repeat">
-      <a:schemeClr val="accent2">
-        <a:tint val="40000"/>
-        <a:alpha val="90000"/>
-      </a:schemeClr>
-      <a:schemeClr val="accent3">
-        <a:tint val="40000"/>
-        <a:alpha val="90000"/>
-      </a:schemeClr>
-      <a:schemeClr val="accent4">
-        <a:tint val="40000"/>
-        <a:alpha val="90000"/>
-      </a:schemeClr>
-      <a:schemeClr val="accent5">
-        <a:tint val="40000"/>
-        <a:alpha val="90000"/>
-      </a:schemeClr>
-      <a:schemeClr val="accent6">
-        <a:tint val="40000"/>
-        <a:alpha val="90000"/>
-      </a:schemeClr>
-    </dgm:linClrLst>
-    <dgm:effectClrLst/>
-    <dgm:txLinClrLst/>
-    <dgm:txFillClrLst meth="repeat">
-      <a:schemeClr val="dk1"/>
-    </dgm:txFillClrLst>
-    <dgm:txEffectClrLst/>
-  </dgm:styleLbl>
-  <dgm:styleLbl name="alignAccFollowNode1">
-    <dgm:fillClrLst meth="repeat">
-      <a:schemeClr val="accent2">
-        <a:tint val="40000"/>
-        <a:alpha val="90000"/>
-      </a:schemeClr>
-      <a:schemeClr val="accent3">
-        <a:tint val="40000"/>
-        <a:alpha val="90000"/>
-      </a:schemeClr>
-      <a:schemeClr val="accent4">
-        <a:tint val="40000"/>
-        <a:alpha val="90000"/>
-      </a:schemeClr>
-      <a:schemeClr val="accent5">
-        <a:tint val="40000"/>
-        <a:alpha val="90000"/>
-      </a:schemeClr>
-      <a:schemeClr val="accent6">
-        <a:tint val="40000"/>
-        <a:alpha val="90000"/>
-      </a:schemeClr>
-    </dgm:fillClrLst>
-    <dgm:linClrLst meth="repeat">
-      <a:schemeClr val="accent2">
-        <a:tint val="40000"/>
-        <a:alpha val="90000"/>
-      </a:schemeClr>
-      <a:schemeClr val="accent3">
-        <a:tint val="40000"/>
-        <a:alpha val="90000"/>
-      </a:schemeClr>
-      <a:schemeClr val="accent4">
-        <a:tint val="40000"/>
-        <a:alpha val="90000"/>
-      </a:schemeClr>
-      <a:schemeClr val="accent5">
-        <a:tint val="40000"/>
-        <a:alpha val="90000"/>
-      </a:schemeClr>
-      <a:schemeClr val="accent6">
-        <a:tint val="40000"/>
-        <a:alpha val="90000"/>
-      </a:schemeClr>
-    </dgm:linClrLst>
-    <dgm:effectClrLst/>
-    <dgm:txLinClrLst/>
-    <dgm:txFillClrLst meth="repeat">
-      <a:schemeClr val="dk1"/>
-    </dgm:txFillClrLst>
-    <dgm:txEffectClrLst/>
-  </dgm:styleLbl>
-  <dgm:styleLbl name="bgAccFollowNode1">
-    <dgm:fillClrLst meth="repeat">
-      <a:schemeClr val="accent2">
-        <a:tint val="40000"/>
-        <a:alpha val="90000"/>
-      </a:schemeClr>
-      <a:schemeClr val="accent3">
-        <a:tint val="40000"/>
-        <a:alpha val="90000"/>
-      </a:schemeClr>
-      <a:schemeClr val="accent4">
-        <a:tint val="40000"/>
-        <a:alpha val="90000"/>
-      </a:schemeClr>
-      <a:schemeClr val="accent5">
-        <a:tint val="40000"/>
-        <a:alpha val="90000"/>
-      </a:schemeClr>
-      <a:schemeClr val="accent6">
-        <a:tint val="40000"/>
-        <a:alpha val="90000"/>
-      </a:schemeClr>
-    </dgm:fillClrLst>
-    <dgm:linClrLst meth="repeat">
-      <a:schemeClr val="accent2">
-        <a:tint val="40000"/>
-        <a:alpha val="90000"/>
-      </a:schemeClr>
-      <a:schemeClr val="accent3">
-        <a:tint val="40000"/>
-        <a:alpha val="90000"/>
-      </a:schemeClr>
-      <a:schemeClr val="accent4">
-        <a:tint val="40000"/>
-        <a:alpha val="90000"/>
-      </a:schemeClr>
-      <a:schemeClr val="accent5">
-        <a:tint val="40000"/>
-        <a:alpha val="90000"/>
-      </a:schemeClr>
-      <a:schemeClr val="accent6">
-        <a:tint val="40000"/>
-        <a:alpha val="90000"/>
-      </a:schemeClr>
-    </dgm:linClrLst>
-    <dgm:effectClrLst/>
-    <dgm:txLinClrLst/>
-    <dgm:txFillClrLst meth="repeat">
-      <a:schemeClr val="dk1"/>
-    </dgm:txFillClrLst>
-    <dgm:txEffectClrLst/>
-  </dgm:styleLbl>
-  <dgm:styleLbl name="fgAcc0">
-    <dgm:fillClrLst meth="repeat">
-      <a:schemeClr val="lt1">
-        <a:alpha val="90000"/>
-      </a:schemeClr>
-    </dgm:fillClrLst>
-    <dgm:linClrLst>
-      <a:schemeClr val="accent1"/>
-    </dgm:linClrLst>
-    <dgm:effectClrLst/>
-    <dgm:txLinClrLst/>
-    <dgm:txFillClrLst meth="repeat">
-      <a:schemeClr val="dk1"/>
-    </dgm:txFillClrLst>
-    <dgm:txEffectClrLst/>
-  </dgm:styleLbl>
-  <dgm:styleLbl name="fgAcc2">
-    <dgm:fillClrLst meth="repeat">
-      <a:schemeClr val="lt1">
-        <a:alpha val="90000"/>
-      </a:schemeClr>
-    </dgm:fillClrLst>
-    <dgm:linClrLst>
-      <a:schemeClr val="accent2"/>
-    </dgm:linClrLst>
-    <dgm:effectClrLst/>
-    <dgm:txLinClrLst/>
-    <dgm:txFillClrLst meth="repeat">
-      <a:schemeClr val="dk1"/>
-    </dgm:txFillClrLst>
-    <dgm:txEffectClrLst/>
-  </dgm:styleLbl>
-  <dgm:styleLbl name="fgAcc3">
-    <dgm:fillClrLst meth="repeat">
-      <a:schemeClr val="lt1">
-        <a:alpha val="90000"/>
-      </a:schemeClr>
-    </dgm:fillClrLst>
-    <dgm:linClrLst>
-      <a:schemeClr val="accent3"/>
-    </dgm:linClrLst>
-    <dgm:effectClrLst/>
-    <dgm:txLinClrLst/>
-    <dgm:txFillClrLst meth="repeat">
-      <a:schemeClr val="dk1"/>
-    </dgm:txFillClrLst>
-    <dgm:txEffectClrLst/>
-  </dgm:styleLbl>
-  <dgm:styleLbl name="fgAcc4">
-    <dgm:fillClrLst meth="repeat">
-      <a:schemeClr val="lt1">
-        <a:alpha val="90000"/>
-      </a:schemeClr>
-    </dgm:fillClrLst>
-    <dgm:linClrLst>
-      <a:schemeClr val="accent4"/>
-    </dgm:linClrLst>
-    <dgm:effectClrLst/>
-    <dgm:txLinClrLst/>
-    <dgm:txFillClrLst meth="repeat">
-      <a:schemeClr val="dk1"/>
-    </dgm:txFillClrLst>
-    <dgm:txEffectClrLst/>
-  </dgm:styleLbl>
-  <dgm:styleLbl name="bgShp">
-    <dgm:fillClrLst meth="repeat">
-      <a:schemeClr val="accent2"/>
-      <a:schemeClr val="accent3"/>
-      <a:schemeClr val="accent4"/>
-      <a:schemeClr val="accent5"/>
-      <a:schemeClr val="accent6"/>
-    </dgm:fillClrLst>
-    <dgm:linClrLst meth="repeat">
-      <a:schemeClr val="lt1">
-        <a:alpha val="0"/>
-      </a:schemeClr>
-    </dgm:linClrLst>
-    <dgm:effectClrLst/>
-    <dgm:txLinClrLst/>
-    <dgm:txFillClrLst/>
-    <dgm:txEffectClrLst/>
-  </dgm:styleLbl>
-  <dgm:styleLbl name="dkBgShp">
-    <dgm:fillClrLst meth="repeat">
-      <a:schemeClr val="accent2">
-        <a:shade val="90000"/>
-      </a:schemeClr>
-    </dgm:fillClrLst>
-    <dgm:linClrLst meth="repeat">
-      <a:schemeClr val="dk1"/>
-    </dgm:linClrLst>
-    <dgm:effectClrLst/>
-    <dgm:txLinClrLst/>
-    <dgm:txFillClrLst meth="repeat">
-      <a:schemeClr val="lt1"/>
-    </dgm:txFillClrLst>
-    <dgm:txEffectClrLst/>
-  </dgm:styleLbl>
-  <dgm:styleLbl name="trBgShp">
-    <dgm:fillClrLst meth="repeat">
-      <a:schemeClr val="accent1">
-        <a:tint val="50000"/>
-        <a:alpha val="40000"/>
-      </a:schemeClr>
-    </dgm:fillClrLst>
-    <dgm:linClrLst meth="repeat">
-      <a:schemeClr val="accent2"/>
-    </dgm:linClrLst>
-    <dgm:effectClrLst/>
-    <dgm:txLinClrLst/>
-    <dgm:txFillClrLst meth="repeat">
-      <a:schemeClr val="lt1"/>
-    </dgm:txFillClrLst>
-    <dgm:txEffectClrLst/>
-  </dgm:styleLbl>
-  <dgm:styleLbl name="fgShp">
-    <dgm:fillClrLst meth="repeat">
-      <a:schemeClr val="accent2">
-        <a:tint val="40000"/>
-      </a:schemeClr>
-    </dgm:fillClrLst>
-    <dgm:linClrLst meth="repeat">
-      <a:schemeClr val="lt1"/>
-    </dgm:linClrLst>
-    <dgm:effectClrLst/>
-    <dgm:txLinClrLst/>
-    <dgm:txFillClrLst meth="repeat">
-      <a:schemeClr val="dk1"/>
-    </dgm:txFillClrLst>
-    <dgm:txEffectClrLst/>
-  </dgm:styleLbl>
-  <dgm:styleLbl name="revTx">
-    <dgm:fillClrLst meth="repeat">
-      <a:schemeClr val="lt1">
-        <a:alpha val="0"/>
-      </a:schemeClr>
-    </dgm:fillClrLst>
-    <dgm:linClrLst meth="repeat">
-      <a:schemeClr val="dk1">
-        <a:alpha val="0"/>
-      </a:schemeClr>
-    </dgm:linClrLst>
-    <dgm:effectClrLst/>
-    <dgm:txLinClrLst/>
-    <dgm:txFillClrLst meth="repeat">
-      <a:schemeClr val="tx1"/>
-    </dgm:txFillClrLst>
-    <dgm:txEffectClrLst/>
-  </dgm:styleLbl>
-</dgm:colorsDef>
-</file>
-
-<file path=ppt/diagrams/data1.xml><?xml version="1.0" encoding="utf-8"?>
-<dgm:dataModel xmlns:dgm="http://schemas.openxmlformats.org/drawingml/2006/diagram" xmlns:a="http://schemas.openxmlformats.org/drawingml/2006/main">
-  <dgm:ptLst>
-    <dgm:pt modelId="{01A66772-F185-4D58-B8BB-E9370D7A7A2B}" type="doc">
-      <dgm:prSet loTypeId="urn:microsoft.com/office/officeart/2018/5/layout/IconLeafLabelList" loCatId="icon" qsTypeId="urn:microsoft.com/office/officeart/2005/8/quickstyle/simple1" qsCatId="simple" csTypeId="urn:microsoft.com/office/officeart/2018/5/colors/Iconchunking_neutralicon_colorful1" csCatId="colorful" phldr="1"/>
-      <dgm:spPr/>
-      <dgm:t>
-        <a:bodyPr/>
-        <a:lstStyle/>
-        <a:p>
-          <a:endParaRPr lang="en-US"/>
-        </a:p>
-      </dgm:t>
-    </dgm:pt>
-    <dgm:pt modelId="{40FC4FFE-8987-4A26-B7F4-8A516F18ADAE}">
-      <dgm:prSet/>
-      <dgm:spPr/>
-      <dgm:t>
-        <a:bodyPr/>
-        <a:lstStyle/>
-        <a:p>
-          <a:pPr>
-            <a:lnSpc>
-              <a:spcPct val="100000"/>
-            </a:lnSpc>
-            <a:defRPr cap="all"/>
-          </a:pPr>
-          <a:r>
-            <a:rPr lang="en-US" dirty="0"/>
-            <a:t>Lorem ipsum dolor sit amet.</a:t>
-          </a:r>
-        </a:p>
-      </dgm:t>
-    </dgm:pt>
-    <dgm:pt modelId="{CAD7EF86-FB23-41F6-BF42-040B36DEFDB1}" type="parTrans" cxnId="{C7AD8469-3C68-4AF9-AB82-79B0043AA120}">
-      <dgm:prSet/>
-      <dgm:spPr/>
-      <dgm:t>
-        <a:bodyPr/>
-        <a:lstStyle/>
-        <a:p>
-          <a:endParaRPr lang="en-US"/>
-        </a:p>
-      </dgm:t>
-    </dgm:pt>
-    <dgm:pt modelId="{5B62599A-5C9B-48E7-896E-EA782AC60C8B}" type="sibTrans" cxnId="{C7AD8469-3C68-4AF9-AB82-79B0043AA120}">
-      <dgm:prSet/>
-      <dgm:spPr/>
-      <dgm:t>
-        <a:bodyPr/>
-        <a:lstStyle/>
-        <a:p>
-          <a:endParaRPr lang="en-US"/>
-        </a:p>
-      </dgm:t>
-    </dgm:pt>
-    <dgm:pt modelId="{49225C73-1633-42F1-AB3B-7CB183E5F8B8}">
-      <dgm:prSet/>
-      <dgm:spPr/>
-      <dgm:t>
-        <a:bodyPr/>
-        <a:lstStyle/>
-        <a:p>
-          <a:pPr>
-            <a:lnSpc>
-              <a:spcPct val="100000"/>
-            </a:lnSpc>
-            <a:defRPr cap="all"/>
-          </a:pPr>
-          <a:r>
-            <a:rPr lang="en-US" dirty="0"/>
-            <a:t>Lorem ipsum dolor sit amet</a:t>
-          </a:r>
-        </a:p>
-      </dgm:t>
-    </dgm:pt>
-    <dgm:pt modelId="{1A0E2090-1D4F-438A-8766-B6030CE01ADD}" type="parTrans" cxnId="{A9154303-8225-4248-91DC-1B0156A35F07}">
-      <dgm:prSet/>
-      <dgm:spPr/>
-      <dgm:t>
-        <a:bodyPr/>
-        <a:lstStyle/>
-        <a:p>
-          <a:endParaRPr lang="en-US"/>
-        </a:p>
-      </dgm:t>
-    </dgm:pt>
-    <dgm:pt modelId="{9646853A-8964-4519-A5B1-0B7D18B2983D}" type="sibTrans" cxnId="{A9154303-8225-4248-91DC-1B0156A35F07}">
-      <dgm:prSet/>
-      <dgm:spPr/>
-      <dgm:t>
-        <a:bodyPr/>
-        <a:lstStyle/>
-        <a:p>
-          <a:endParaRPr lang="en-US"/>
-        </a:p>
-      </dgm:t>
-    </dgm:pt>
-    <dgm:pt modelId="{1C383F32-22E8-4F62-A3E0-BDC3D5F48992}">
-      <dgm:prSet/>
-      <dgm:spPr/>
-      <dgm:t>
-        <a:bodyPr/>
-        <a:lstStyle/>
-        <a:p>
-          <a:pPr>
-            <a:lnSpc>
-              <a:spcPct val="100000"/>
-            </a:lnSpc>
-            <a:defRPr cap="all"/>
-          </a:pPr>
-          <a:r>
-            <a:rPr lang="en-US" dirty="0"/>
-            <a:t>Lorem Ipsum Dolor Sit Amet</a:t>
-          </a:r>
-        </a:p>
-      </dgm:t>
-    </dgm:pt>
-    <dgm:pt modelId="{A7920A2F-3244-4159-AF04-6A1D38B7B317}" type="parTrans" cxnId="{C4CCE57E-E871-46D6-BAD5-880252C95D22}">
-      <dgm:prSet/>
-      <dgm:spPr/>
-      <dgm:t>
-        <a:bodyPr/>
-        <a:lstStyle/>
-        <a:p>
-          <a:endParaRPr lang="en-US"/>
-        </a:p>
-      </dgm:t>
-    </dgm:pt>
-    <dgm:pt modelId="{8500F72A-2C6D-4FDF-9C1D-CA691380EB0B}" type="sibTrans" cxnId="{C4CCE57E-E871-46D6-BAD5-880252C95D22}">
-      <dgm:prSet/>
-      <dgm:spPr/>
-      <dgm:t>
-        <a:bodyPr/>
-        <a:lstStyle/>
-        <a:p>
-          <a:endParaRPr lang="en-US"/>
-        </a:p>
-      </dgm:t>
-    </dgm:pt>
-    <dgm:pt modelId="{B6056BFB-47D7-4C5F-BA11-2CB63C56A52D}" type="pres">
-      <dgm:prSet presAssocID="{01A66772-F185-4D58-B8BB-E9370D7A7A2B}" presName="root" presStyleCnt="0">
-        <dgm:presLayoutVars>
-          <dgm:dir/>
-          <dgm:resizeHandles val="exact"/>
-        </dgm:presLayoutVars>
-      </dgm:prSet>
-      <dgm:spPr/>
-    </dgm:pt>
-    <dgm:pt modelId="{311B26C8-22B1-4363-B621-DD56FB7418C8}" type="pres">
-      <dgm:prSet presAssocID="{40FC4FFE-8987-4A26-B7F4-8A516F18ADAE}" presName="compNode" presStyleCnt="0"/>
-      <dgm:spPr/>
-    </dgm:pt>
-    <dgm:pt modelId="{A201D7A7-914C-4D24-8B82-EE40155AB0BE}" type="pres">
-      <dgm:prSet presAssocID="{40FC4FFE-8987-4A26-B7F4-8A516F18ADAE}" presName="iconBgRect" presStyleLbl="bgShp" presStyleIdx="0" presStyleCnt="3"/>
-      <dgm:spPr>
-        <a:prstGeom prst="ellipse">
-          <a:avLst/>
-        </a:prstGeom>
-      </dgm:spPr>
-    </dgm:pt>
-    <dgm:pt modelId="{8FA2F131-CD01-4CBD-B7A5-1B9B5E7F0402}" type="pres">
-      <dgm:prSet presAssocID="{40FC4FFE-8987-4A26-B7F4-8A516F18ADAE}" presName="iconRect" presStyleLbl="node1" presStyleIdx="0" presStyleCnt="3"/>
-      <dgm:spPr>
-        <a:blipFill>
-          <a:blip xmlns:r="http://schemas.openxmlformats.org/officeDocument/2006/relationships" r:embed="rId1">
-            <a:extLst>
-              <a:ext uri="{28A0092B-C50C-407E-A947-70E740481C1C}">
-                <a14:useLocalDpi xmlns:a14="http://schemas.microsoft.com/office/drawing/2010/main" val="0"/>
-              </a:ext>
-              <a:ext uri="{96DAC541-7B7A-43D3-8B79-37D633B846F1}">
-                <asvg:svgBlip xmlns:asvg="http://schemas.microsoft.com/office/drawing/2016/SVG/main" r:embed="rId2"/>
-              </a:ext>
-            </a:extLst>
-          </a:blip>
-          <a:srcRect/>
-          <a:stretch>
-            <a:fillRect/>
-          </a:stretch>
-        </a:blipFill>
-        <a:ln>
-          <a:noFill/>
-        </a:ln>
-      </dgm:spPr>
-      <dgm:extLst>
-        <a:ext uri="{E40237B7-FDA0-4F09-8148-C483321AD2D9}">
-          <dgm14:cNvPr xmlns:dgm14="http://schemas.microsoft.com/office/drawing/2010/diagram" id="0" name="" descr="Flowers in pot"/>
-        </a:ext>
-      </dgm:extLst>
-    </dgm:pt>
-    <dgm:pt modelId="{F755F00C-B2DB-4097-B4BC-8F1BACC938B7}" type="pres">
-      <dgm:prSet presAssocID="{40FC4FFE-8987-4A26-B7F4-8A516F18ADAE}" presName="spaceRect" presStyleCnt="0"/>
-      <dgm:spPr/>
-    </dgm:pt>
-    <dgm:pt modelId="{08F4E96D-0DB6-4476-8C51-7CC7EC2F227B}" type="pres">
-      <dgm:prSet presAssocID="{40FC4FFE-8987-4A26-B7F4-8A516F18ADAE}" presName="textRect" presStyleLbl="revTx" presStyleIdx="0" presStyleCnt="3">
-        <dgm:presLayoutVars>
-          <dgm:chMax val="1"/>
-          <dgm:chPref val="1"/>
-        </dgm:presLayoutVars>
-      </dgm:prSet>
-      <dgm:spPr/>
-    </dgm:pt>
-    <dgm:pt modelId="{5AB3C10D-885E-4522-AB39-7ED4318D191A}" type="pres">
-      <dgm:prSet presAssocID="{5B62599A-5C9B-48E7-896E-EA782AC60C8B}" presName="sibTrans" presStyleCnt="0"/>
-      <dgm:spPr/>
-    </dgm:pt>
-    <dgm:pt modelId="{2F278BF9-E1B2-4A1C-B065-C19A7B904219}" type="pres">
-      <dgm:prSet presAssocID="{49225C73-1633-42F1-AB3B-7CB183E5F8B8}" presName="compNode" presStyleCnt="0"/>
-      <dgm:spPr/>
-    </dgm:pt>
-    <dgm:pt modelId="{543C18BC-1989-44B2-9862-C670C61D3452}" type="pres">
-      <dgm:prSet presAssocID="{49225C73-1633-42F1-AB3B-7CB183E5F8B8}" presName="iconBgRect" presStyleLbl="bgShp" presStyleIdx="1" presStyleCnt="3"/>
-      <dgm:spPr>
-        <a:prstGeom prst="ellipse">
-          <a:avLst/>
-        </a:prstGeom>
-      </dgm:spPr>
-    </dgm:pt>
-    <dgm:pt modelId="{E94F35BC-9C76-400A-BBCA-0032259E2E5A}" type="pres">
-      <dgm:prSet presAssocID="{49225C73-1633-42F1-AB3B-7CB183E5F8B8}" presName="iconRect" presStyleLbl="node1" presStyleIdx="1" presStyleCnt="3"/>
-      <dgm:spPr>
-        <a:blipFill>
-          <a:blip xmlns:r="http://schemas.openxmlformats.org/officeDocument/2006/relationships" r:embed="rId3">
-            <a:extLst>
-              <a:ext uri="{28A0092B-C50C-407E-A947-70E740481C1C}">
-                <a14:useLocalDpi xmlns:a14="http://schemas.microsoft.com/office/drawing/2010/main" val="0"/>
-              </a:ext>
-              <a:ext uri="{96DAC541-7B7A-43D3-8B79-37D633B846F1}">
-                <asvg:svgBlip xmlns:asvg="http://schemas.microsoft.com/office/drawing/2016/SVG/main" r:embed="rId4"/>
-              </a:ext>
-            </a:extLst>
-          </a:blip>
-          <a:srcRect/>
-          <a:stretch>
-            <a:fillRect/>
-          </a:stretch>
-        </a:blipFill>
-        <a:ln>
-          <a:noFill/>
-        </a:ln>
-      </dgm:spPr>
-      <dgm:extLst>
-        <a:ext uri="{E40237B7-FDA0-4F09-8148-C483321AD2D9}">
-          <dgm14:cNvPr xmlns:dgm14="http://schemas.microsoft.com/office/drawing/2010/diagram" id="0" name="" descr="Deciduous tree"/>
-        </a:ext>
-      </dgm:extLst>
-    </dgm:pt>
-    <dgm:pt modelId="{503A6D04-9ADD-43CC-9847-497CD48F2D11}" type="pres">
-      <dgm:prSet presAssocID="{49225C73-1633-42F1-AB3B-7CB183E5F8B8}" presName="spaceRect" presStyleCnt="0"/>
-      <dgm:spPr/>
-    </dgm:pt>
-    <dgm:pt modelId="{20363298-B2A6-463D-A7BE-F9F67404E389}" type="pres">
-      <dgm:prSet presAssocID="{49225C73-1633-42F1-AB3B-7CB183E5F8B8}" presName="textRect" presStyleLbl="revTx" presStyleIdx="1" presStyleCnt="3">
-        <dgm:presLayoutVars>
-          <dgm:chMax val="1"/>
-          <dgm:chPref val="1"/>
-        </dgm:presLayoutVars>
-      </dgm:prSet>
-      <dgm:spPr/>
-    </dgm:pt>
-    <dgm:pt modelId="{A47947BB-708D-4F7E-B072-3C2E42B34B24}" type="pres">
-      <dgm:prSet presAssocID="{9646853A-8964-4519-A5B1-0B7D18B2983D}" presName="sibTrans" presStyleCnt="0"/>
-      <dgm:spPr/>
-    </dgm:pt>
-    <dgm:pt modelId="{BDCD0AC9-D564-4025-AD8A-36664A6CBE31}" type="pres">
-      <dgm:prSet presAssocID="{1C383F32-22E8-4F62-A3E0-BDC3D5F48992}" presName="compNode" presStyleCnt="0"/>
-      <dgm:spPr/>
-    </dgm:pt>
-    <dgm:pt modelId="{5BDDFF18-9AEC-4E5E-B9AA-33D86F01A63E}" type="pres">
-      <dgm:prSet presAssocID="{1C383F32-22E8-4F62-A3E0-BDC3D5F48992}" presName="iconBgRect" presStyleLbl="bgShp" presStyleIdx="2" presStyleCnt="3"/>
-      <dgm:spPr>
-        <a:prstGeom prst="ellipse">
-          <a:avLst/>
-        </a:prstGeom>
-      </dgm:spPr>
-    </dgm:pt>
-    <dgm:pt modelId="{F09AEBFF-D2D3-4FFF-AD65-C3CEAEEB10F2}" type="pres">
-      <dgm:prSet presAssocID="{1C383F32-22E8-4F62-A3E0-BDC3D5F48992}" presName="iconRect" presStyleLbl="node1" presStyleIdx="2" presStyleCnt="3"/>
-      <dgm:spPr>
-        <a:blipFill>
-          <a:blip xmlns:r="http://schemas.openxmlformats.org/officeDocument/2006/relationships" r:embed="rId5">
-            <a:extLst>
-              <a:ext uri="{28A0092B-C50C-407E-A947-70E740481C1C}">
-                <a14:useLocalDpi xmlns:a14="http://schemas.microsoft.com/office/drawing/2010/main" val="0"/>
-              </a:ext>
-              <a:ext uri="{96DAC541-7B7A-43D3-8B79-37D633B846F1}">
-                <asvg:svgBlip xmlns:asvg="http://schemas.microsoft.com/office/drawing/2016/SVG/main" r:embed="rId6"/>
-              </a:ext>
-            </a:extLst>
-          </a:blip>
-          <a:srcRect/>
-          <a:stretch>
-            <a:fillRect/>
-          </a:stretch>
-        </a:blipFill>
-        <a:ln>
-          <a:noFill/>
-        </a:ln>
-      </dgm:spPr>
-      <dgm:extLst>
-        <a:ext uri="{E40237B7-FDA0-4F09-8148-C483321AD2D9}">
-          <dgm14:cNvPr xmlns:dgm14="http://schemas.microsoft.com/office/drawing/2010/diagram" id="0" name="" descr="Bee"/>
-        </a:ext>
-      </dgm:extLst>
-    </dgm:pt>
-    <dgm:pt modelId="{F2EBFBCF-0520-415A-A886-3C4F90D208EF}" type="pres">
-      <dgm:prSet presAssocID="{1C383F32-22E8-4F62-A3E0-BDC3D5F48992}" presName="spaceRect" presStyleCnt="0"/>
-      <dgm:spPr/>
-    </dgm:pt>
-    <dgm:pt modelId="{AB9CAFAA-6939-48A6-A89B-19D1A94B9EA1}" type="pres">
-      <dgm:prSet presAssocID="{1C383F32-22E8-4F62-A3E0-BDC3D5F48992}" presName="textRect" presStyleLbl="revTx" presStyleIdx="2" presStyleCnt="3">
-        <dgm:presLayoutVars>
-          <dgm:chMax val="1"/>
-          <dgm:chPref val="1"/>
-        </dgm:presLayoutVars>
-      </dgm:prSet>
-      <dgm:spPr/>
-    </dgm:pt>
-  </dgm:ptLst>
-  <dgm:cxnLst>
-    <dgm:cxn modelId="{A9154303-8225-4248-91DC-1B0156A35F07}" srcId="{01A66772-F185-4D58-B8BB-E9370D7A7A2B}" destId="{49225C73-1633-42F1-AB3B-7CB183E5F8B8}" srcOrd="1" destOrd="0" parTransId="{1A0E2090-1D4F-438A-8766-B6030CE01ADD}" sibTransId="{9646853A-8964-4519-A5B1-0B7D18B2983D}"/>
-    <dgm:cxn modelId="{BA953D32-2DFF-47FE-AF26-C6B9E63D38DF}" type="presOf" srcId="{49225C73-1633-42F1-AB3B-7CB183E5F8B8}" destId="{20363298-B2A6-463D-A7BE-F9F67404E389}" srcOrd="0" destOrd="0" presId="urn:microsoft.com/office/officeart/2018/5/layout/IconLeafLabelList"/>
-    <dgm:cxn modelId="{EC450542-0ED9-4BD6-9E85-5709B80794C5}" type="presOf" srcId="{01A66772-F185-4D58-B8BB-E9370D7A7A2B}" destId="{B6056BFB-47D7-4C5F-BA11-2CB63C56A52D}" srcOrd="0" destOrd="0" presId="urn:microsoft.com/office/officeart/2018/5/layout/IconLeafLabelList"/>
-    <dgm:cxn modelId="{C7AD8469-3C68-4AF9-AB82-79B0043AA120}" srcId="{01A66772-F185-4D58-B8BB-E9370D7A7A2B}" destId="{40FC4FFE-8987-4A26-B7F4-8A516F18ADAE}" srcOrd="0" destOrd="0" parTransId="{CAD7EF86-FB23-41F6-BF42-040B36DEFDB1}" sibTransId="{5B62599A-5C9B-48E7-896E-EA782AC60C8B}"/>
-    <dgm:cxn modelId="{C4CCE57E-E871-46D6-BAD5-880252C95D22}" srcId="{01A66772-F185-4D58-B8BB-E9370D7A7A2B}" destId="{1C383F32-22E8-4F62-A3E0-BDC3D5F48992}" srcOrd="2" destOrd="0" parTransId="{A7920A2F-3244-4159-AF04-6A1D38B7B317}" sibTransId="{8500F72A-2C6D-4FDF-9C1D-CA691380EB0B}"/>
-    <dgm:cxn modelId="{D55FAE9C-CF3C-44F3-9D1E-DE6DF574E6D9}" type="presOf" srcId="{1C383F32-22E8-4F62-A3E0-BDC3D5F48992}" destId="{AB9CAFAA-6939-48A6-A89B-19D1A94B9EA1}" srcOrd="0" destOrd="0" presId="urn:microsoft.com/office/officeart/2018/5/layout/IconLeafLabelList"/>
-    <dgm:cxn modelId="{A85983B4-FADF-419C-BC71-B5F0871C3055}" type="presOf" srcId="{40FC4FFE-8987-4A26-B7F4-8A516F18ADAE}" destId="{08F4E96D-0DB6-4476-8C51-7CC7EC2F227B}" srcOrd="0" destOrd="0" presId="urn:microsoft.com/office/officeart/2018/5/layout/IconLeafLabelList"/>
-    <dgm:cxn modelId="{A3E74EE8-8900-4EBD-8983-3BF0AFD6DCC7}" type="presParOf" srcId="{B6056BFB-47D7-4C5F-BA11-2CB63C56A52D}" destId="{311B26C8-22B1-4363-B621-DD56FB7418C8}" srcOrd="0" destOrd="0" presId="urn:microsoft.com/office/officeart/2018/5/layout/IconLeafLabelList"/>
-    <dgm:cxn modelId="{044EA9E0-B51B-492A-BE32-015CEAD0BAC9}" type="presParOf" srcId="{311B26C8-22B1-4363-B621-DD56FB7418C8}" destId="{A201D7A7-914C-4D24-8B82-EE40155AB0BE}" srcOrd="0" destOrd="0" presId="urn:microsoft.com/office/officeart/2018/5/layout/IconLeafLabelList"/>
-    <dgm:cxn modelId="{08373EC6-14CB-429D-9495-F32683B931D7}" type="presParOf" srcId="{311B26C8-22B1-4363-B621-DD56FB7418C8}" destId="{8FA2F131-CD01-4CBD-B7A5-1B9B5E7F0402}" srcOrd="1" destOrd="0" presId="urn:microsoft.com/office/officeart/2018/5/layout/IconLeafLabelList"/>
-    <dgm:cxn modelId="{9AB500F0-62A2-4E73-B4F4-5056804C8D6A}" type="presParOf" srcId="{311B26C8-22B1-4363-B621-DD56FB7418C8}" destId="{F755F00C-B2DB-4097-B4BC-8F1BACC938B7}" srcOrd="2" destOrd="0" presId="urn:microsoft.com/office/officeart/2018/5/layout/IconLeafLabelList"/>
-    <dgm:cxn modelId="{676606A7-6564-4CEB-ACE0-4FF9A3A04E67}" type="presParOf" srcId="{311B26C8-22B1-4363-B621-DD56FB7418C8}" destId="{08F4E96D-0DB6-4476-8C51-7CC7EC2F227B}" srcOrd="3" destOrd="0" presId="urn:microsoft.com/office/officeart/2018/5/layout/IconLeafLabelList"/>
-    <dgm:cxn modelId="{EAE0F94A-A454-4049-84F7-9EC90E847A03}" type="presParOf" srcId="{B6056BFB-47D7-4C5F-BA11-2CB63C56A52D}" destId="{5AB3C10D-885E-4522-AB39-7ED4318D191A}" srcOrd="1" destOrd="0" presId="urn:microsoft.com/office/officeart/2018/5/layout/IconLeafLabelList"/>
-    <dgm:cxn modelId="{B0B5B21A-5ADD-4500-9A67-9B26AF543EBA}" type="presParOf" srcId="{B6056BFB-47D7-4C5F-BA11-2CB63C56A52D}" destId="{2F278BF9-E1B2-4A1C-B065-C19A7B904219}" srcOrd="2" destOrd="0" presId="urn:microsoft.com/office/officeart/2018/5/layout/IconLeafLabelList"/>
-    <dgm:cxn modelId="{11FEAF2C-54F7-4E9C-A1D6-5FA0BF7F3665}" type="presParOf" srcId="{2F278BF9-E1B2-4A1C-B065-C19A7B904219}" destId="{543C18BC-1989-44B2-9862-C670C61D3452}" srcOrd="0" destOrd="0" presId="urn:microsoft.com/office/officeart/2018/5/layout/IconLeafLabelList"/>
-    <dgm:cxn modelId="{92C17ECB-A80D-4A0E-95CF-40A53D32275F}" type="presParOf" srcId="{2F278BF9-E1B2-4A1C-B065-C19A7B904219}" destId="{E94F35BC-9C76-400A-BBCA-0032259E2E5A}" srcOrd="1" destOrd="0" presId="urn:microsoft.com/office/officeart/2018/5/layout/IconLeafLabelList"/>
-    <dgm:cxn modelId="{54E5AE33-4BE6-44E7-871B-1103A0BA7A56}" type="presParOf" srcId="{2F278BF9-E1B2-4A1C-B065-C19A7B904219}" destId="{503A6D04-9ADD-43CC-9847-497CD48F2D11}" srcOrd="2" destOrd="0" presId="urn:microsoft.com/office/officeart/2018/5/layout/IconLeafLabelList"/>
-    <dgm:cxn modelId="{3575FCA0-4FCE-460A-8D84-2C767D311A20}" type="presParOf" srcId="{2F278BF9-E1B2-4A1C-B065-C19A7B904219}" destId="{20363298-B2A6-463D-A7BE-F9F67404E389}" srcOrd="3" destOrd="0" presId="urn:microsoft.com/office/officeart/2018/5/layout/IconLeafLabelList"/>
-    <dgm:cxn modelId="{4FD22448-C17B-4C43-BAB3-A0B7AA9BCE0D}" type="presParOf" srcId="{B6056BFB-47D7-4C5F-BA11-2CB63C56A52D}" destId="{A47947BB-708D-4F7E-B072-3C2E42B34B24}" srcOrd="3" destOrd="0" presId="urn:microsoft.com/office/officeart/2018/5/layout/IconLeafLabelList"/>
-    <dgm:cxn modelId="{75E30F4F-0E76-457B-9D4F-CDE27C2F7F77}" type="presParOf" srcId="{B6056BFB-47D7-4C5F-BA11-2CB63C56A52D}" destId="{BDCD0AC9-D564-4025-AD8A-36664A6CBE31}" srcOrd="4" destOrd="0" presId="urn:microsoft.com/office/officeart/2018/5/layout/IconLeafLabelList"/>
-    <dgm:cxn modelId="{C6A367E7-6A7C-42CB-94E4-8EA78AEF87BF}" type="presParOf" srcId="{BDCD0AC9-D564-4025-AD8A-36664A6CBE31}" destId="{5BDDFF18-9AEC-4E5E-B9AA-33D86F01A63E}" srcOrd="0" destOrd="0" presId="urn:microsoft.com/office/officeart/2018/5/layout/IconLeafLabelList"/>
-    <dgm:cxn modelId="{B180CBEB-FA9F-4E52-8CA3-A65CB80BB91B}" type="presParOf" srcId="{BDCD0AC9-D564-4025-AD8A-36664A6CBE31}" destId="{F09AEBFF-D2D3-4FFF-AD65-C3CEAEEB10F2}" srcOrd="1" destOrd="0" presId="urn:microsoft.com/office/officeart/2018/5/layout/IconLeafLabelList"/>
-    <dgm:cxn modelId="{170B020E-1E19-4EB4-A72C-4FCF01A7DD7E}" type="presParOf" srcId="{BDCD0AC9-D564-4025-AD8A-36664A6CBE31}" destId="{F2EBFBCF-0520-415A-A886-3C4F90D208EF}" srcOrd="2" destOrd="0" presId="urn:microsoft.com/office/officeart/2018/5/layout/IconLeafLabelList"/>
-    <dgm:cxn modelId="{CADD8F7D-722C-42A0-AF21-39A3559F8D7B}" type="presParOf" srcId="{BDCD0AC9-D564-4025-AD8A-36664A6CBE31}" destId="{AB9CAFAA-6939-48A6-A89B-19D1A94B9EA1}" srcOrd="3" destOrd="0" presId="urn:microsoft.com/office/officeart/2018/5/layout/IconLeafLabelList"/>
-  </dgm:cxnLst>
-  <dgm:bg/>
-  <dgm:whole/>
-  <dgm:extLst>
-    <a:ext uri="http://schemas.microsoft.com/office/drawing/2008/diagram">
-      <dsp:dataModelExt xmlns:dsp="http://schemas.microsoft.com/office/drawing/2008/diagram" relId="rId8" minVer="http://schemas.openxmlformats.org/drawingml/2006/diagram"/>
-    </a:ext>
-  </dgm:extLst>
-</dgm:dataModel>
-</file>
-
-<file path=ppt/diagrams/drawing1.xml><?xml version="1.0" encoding="utf-8"?>
-<dsp:drawing xmlns:dgm="http://schemas.openxmlformats.org/drawingml/2006/diagram" xmlns:dsp="http://schemas.microsoft.com/office/drawing/2008/diagram" xmlns:a="http://schemas.openxmlformats.org/drawingml/2006/main">
-  <dsp:spTree>
-    <dsp:nvGrpSpPr>
-      <dsp:cNvPr id="0" name=""/>
-      <dsp:cNvGrpSpPr/>
-    </dsp:nvGrpSpPr>
-    <dsp:grpSpPr/>
-    <dsp:sp modelId="{A201D7A7-914C-4D24-8B82-EE40155AB0BE}">
-      <dsp:nvSpPr>
-        <dsp:cNvPr id="0" name=""/>
-        <dsp:cNvSpPr/>
-      </dsp:nvSpPr>
-      <dsp:spPr>
-        <a:xfrm>
-          <a:off x="616949" y="340539"/>
-          <a:ext cx="1818562" cy="1818562"/>
-        </a:xfrm>
-        <a:prstGeom prst="ellipse">
-          <a:avLst/>
-        </a:prstGeom>
-        <a:solidFill>
-          <a:schemeClr val="accent2">
-            <a:hueOff val="0"/>
-            <a:satOff val="0"/>
-            <a:lumOff val="0"/>
-            <a:alphaOff val="0"/>
-          </a:schemeClr>
-        </a:solidFill>
-        <a:ln>
-          <a:noFill/>
-        </a:ln>
-        <a:effectLst/>
-      </dsp:spPr>
-      <dsp:style>
-        <a:lnRef idx="0">
-          <a:scrgbClr r="0" g="0" b="0"/>
-        </a:lnRef>
-        <a:fillRef idx="1">
-          <a:scrgbClr r="0" g="0" b="0"/>
-        </a:fillRef>
-        <a:effectRef idx="0">
-          <a:scrgbClr r="0" g="0" b="0"/>
-        </a:effectRef>
-        <a:fontRef idx="minor"/>
-      </dsp:style>
-    </dsp:sp>
-    <dsp:sp modelId="{8FA2F131-CD01-4CBD-B7A5-1B9B5E7F0402}">
-      <dsp:nvSpPr>
-        <dsp:cNvPr id="0" name=""/>
-        <dsp:cNvSpPr/>
-      </dsp:nvSpPr>
-      <dsp:spPr>
-        <a:xfrm>
-          <a:off x="1004512" y="728102"/>
-          <a:ext cx="1043437" cy="1043437"/>
-        </a:xfrm>
-        <a:prstGeom prst="rect">
-          <a:avLst/>
-        </a:prstGeom>
-        <a:blipFill>
-          <a:blip xmlns:r="http://schemas.openxmlformats.org/officeDocument/2006/relationships" r:embed="rId1">
-            <a:extLst>
-              <a:ext uri="{28A0092B-C50C-407E-A947-70E740481C1C}">
-                <a14:useLocalDpi xmlns:a14="http://schemas.microsoft.com/office/drawing/2010/main" val="0"/>
-              </a:ext>
-              <a:ext uri="{96DAC541-7B7A-43D3-8B79-37D633B846F1}">
-                <asvg:svgBlip xmlns:asvg="http://schemas.microsoft.com/office/drawing/2016/SVG/main" r:embed="rId2"/>
-              </a:ext>
-            </a:extLst>
-          </a:blip>
-          <a:srcRect/>
-          <a:stretch>
-            <a:fillRect/>
-          </a:stretch>
-        </a:blipFill>
-        <a:ln w="12700" cap="flat" cmpd="sng" algn="ctr">
-          <a:noFill/>
-          <a:prstDash val="solid"/>
-        </a:ln>
-        <a:effectLst/>
-      </dsp:spPr>
-      <dsp:style>
-        <a:lnRef idx="2">
-          <a:scrgbClr r="0" g="0" b="0"/>
-        </a:lnRef>
-        <a:fillRef idx="1">
-          <a:scrgbClr r="0" g="0" b="0"/>
-        </a:fillRef>
-        <a:effectRef idx="0">
-          <a:scrgbClr r="0" g="0" b="0"/>
-        </a:effectRef>
-        <a:fontRef idx="minor">
-          <a:schemeClr val="lt1"/>
-        </a:fontRef>
-      </dsp:style>
-    </dsp:sp>
-    <dsp:sp modelId="{08F4E96D-0DB6-4476-8C51-7CC7EC2F227B}">
-      <dsp:nvSpPr>
-        <dsp:cNvPr id="0" name=""/>
-        <dsp:cNvSpPr/>
-      </dsp:nvSpPr>
-      <dsp:spPr>
-        <a:xfrm>
-          <a:off x="35606" y="2725540"/>
-          <a:ext cx="2981250" cy="720000"/>
-        </a:xfrm>
-        <a:prstGeom prst="rect">
-          <a:avLst/>
-        </a:prstGeom>
-        <a:noFill/>
-        <a:ln>
-          <a:noFill/>
-        </a:ln>
-        <a:effectLst/>
-      </dsp:spPr>
-      <dsp:style>
-        <a:lnRef idx="0">
-          <a:scrgbClr r="0" g="0" b="0"/>
-        </a:lnRef>
-        <a:fillRef idx="0">
-          <a:scrgbClr r="0" g="0" b="0"/>
-        </a:fillRef>
-        <a:effectRef idx="0">
-          <a:scrgbClr r="0" g="0" b="0"/>
-        </a:effectRef>
-        <a:fontRef idx="minor"/>
-      </dsp:style>
-      <dsp:txBody>
-        <a:bodyPr spcFirstLastPara="0" vert="horz" wrap="square" lIns="0" tIns="0" rIns="0" bIns="0" numCol="1" spcCol="1270" anchor="t" anchorCtr="0">
-          <a:noAutofit/>
-        </a:bodyPr>
-        <a:lstStyle/>
-        <a:p>
-          <a:pPr marL="0" lvl="0" indent="0" algn="ctr" defTabSz="1022350">
-            <a:lnSpc>
-              <a:spcPct val="100000"/>
-            </a:lnSpc>
-            <a:spcBef>
-              <a:spcPct val="0"/>
-            </a:spcBef>
-            <a:spcAft>
-              <a:spcPct val="35000"/>
-            </a:spcAft>
-            <a:buNone/>
-            <a:defRPr cap="all"/>
-          </a:pPr>
-          <a:r>
-            <a:rPr lang="en-US" sz="2300" kern="1200" dirty="0"/>
-            <a:t>Lorem ipsum dolor sit amet.</a:t>
-          </a:r>
-        </a:p>
-      </dsp:txBody>
-      <dsp:txXfrm>
-        <a:off x="35606" y="2725540"/>
-        <a:ext cx="2981250" cy="720000"/>
-      </dsp:txXfrm>
-    </dsp:sp>
-    <dsp:sp modelId="{543C18BC-1989-44B2-9862-C670C61D3452}">
-      <dsp:nvSpPr>
-        <dsp:cNvPr id="0" name=""/>
-        <dsp:cNvSpPr/>
-      </dsp:nvSpPr>
-      <dsp:spPr>
-        <a:xfrm>
-          <a:off x="4119918" y="340539"/>
-          <a:ext cx="1818562" cy="1818562"/>
-        </a:xfrm>
-        <a:prstGeom prst="ellipse">
-          <a:avLst/>
-        </a:prstGeom>
-        <a:solidFill>
-          <a:schemeClr val="accent3">
-            <a:hueOff val="0"/>
-            <a:satOff val="0"/>
-            <a:lumOff val="0"/>
-            <a:alphaOff val="0"/>
-          </a:schemeClr>
-        </a:solidFill>
-        <a:ln>
-          <a:noFill/>
-        </a:ln>
-        <a:effectLst/>
-      </dsp:spPr>
-      <dsp:style>
-        <a:lnRef idx="0">
-          <a:scrgbClr r="0" g="0" b="0"/>
-        </a:lnRef>
-        <a:fillRef idx="1">
-          <a:scrgbClr r="0" g="0" b="0"/>
-        </a:fillRef>
-        <a:effectRef idx="0">
-          <a:scrgbClr r="0" g="0" b="0"/>
-        </a:effectRef>
-        <a:fontRef idx="minor"/>
-      </dsp:style>
-    </dsp:sp>
-    <dsp:sp modelId="{E94F35BC-9C76-400A-BBCA-0032259E2E5A}">
-      <dsp:nvSpPr>
-        <dsp:cNvPr id="0" name=""/>
-        <dsp:cNvSpPr/>
-      </dsp:nvSpPr>
-      <dsp:spPr>
-        <a:xfrm>
-          <a:off x="4507481" y="728102"/>
-          <a:ext cx="1043437" cy="1043437"/>
-        </a:xfrm>
-        <a:prstGeom prst="rect">
-          <a:avLst/>
-        </a:prstGeom>
-        <a:blipFill>
-          <a:blip xmlns:r="http://schemas.openxmlformats.org/officeDocument/2006/relationships" r:embed="rId3">
-            <a:extLst>
-              <a:ext uri="{28A0092B-C50C-407E-A947-70E740481C1C}">
-                <a14:useLocalDpi xmlns:a14="http://schemas.microsoft.com/office/drawing/2010/main" val="0"/>
-              </a:ext>
-              <a:ext uri="{96DAC541-7B7A-43D3-8B79-37D633B846F1}">
-                <asvg:svgBlip xmlns:asvg="http://schemas.microsoft.com/office/drawing/2016/SVG/main" r:embed="rId4"/>
-              </a:ext>
-            </a:extLst>
-          </a:blip>
-          <a:srcRect/>
-          <a:stretch>
-            <a:fillRect/>
-          </a:stretch>
-        </a:blipFill>
-        <a:ln w="12700" cap="flat" cmpd="sng" algn="ctr">
-          <a:noFill/>
-          <a:prstDash val="solid"/>
-        </a:ln>
-        <a:effectLst/>
-      </dsp:spPr>
-      <dsp:style>
-        <a:lnRef idx="2">
-          <a:scrgbClr r="0" g="0" b="0"/>
-        </a:lnRef>
-        <a:fillRef idx="1">
-          <a:scrgbClr r="0" g="0" b="0"/>
-        </a:fillRef>
-        <a:effectRef idx="0">
-          <a:scrgbClr r="0" g="0" b="0"/>
-        </a:effectRef>
-        <a:fontRef idx="minor">
-          <a:schemeClr val="lt1"/>
-        </a:fontRef>
-      </dsp:style>
-    </dsp:sp>
-    <dsp:sp modelId="{20363298-B2A6-463D-A7BE-F9F67404E389}">
-      <dsp:nvSpPr>
-        <dsp:cNvPr id="0" name=""/>
-        <dsp:cNvSpPr/>
-      </dsp:nvSpPr>
-      <dsp:spPr>
-        <a:xfrm>
-          <a:off x="3538574" y="2725540"/>
-          <a:ext cx="2981250" cy="720000"/>
-        </a:xfrm>
-        <a:prstGeom prst="rect">
-          <a:avLst/>
-        </a:prstGeom>
-        <a:noFill/>
-        <a:ln>
-          <a:noFill/>
-        </a:ln>
-        <a:effectLst/>
-      </dsp:spPr>
-      <dsp:style>
-        <a:lnRef idx="0">
-          <a:scrgbClr r="0" g="0" b="0"/>
-        </a:lnRef>
-        <a:fillRef idx="0">
-          <a:scrgbClr r="0" g="0" b="0"/>
-        </a:fillRef>
-        <a:effectRef idx="0">
-          <a:scrgbClr r="0" g="0" b="0"/>
-        </a:effectRef>
-        <a:fontRef idx="minor"/>
-      </dsp:style>
-      <dsp:txBody>
-        <a:bodyPr spcFirstLastPara="0" vert="horz" wrap="square" lIns="0" tIns="0" rIns="0" bIns="0" numCol="1" spcCol="1270" anchor="t" anchorCtr="0">
-          <a:noAutofit/>
-        </a:bodyPr>
-        <a:lstStyle/>
-        <a:p>
-          <a:pPr marL="0" lvl="0" indent="0" algn="ctr" defTabSz="1022350">
-            <a:lnSpc>
-              <a:spcPct val="100000"/>
-            </a:lnSpc>
-            <a:spcBef>
-              <a:spcPct val="0"/>
-            </a:spcBef>
-            <a:spcAft>
-              <a:spcPct val="35000"/>
-            </a:spcAft>
-            <a:buNone/>
-            <a:defRPr cap="all"/>
-          </a:pPr>
-          <a:r>
-            <a:rPr lang="en-US" sz="2300" kern="1200" dirty="0"/>
-            <a:t>Lorem ipsum dolor sit amet</a:t>
-          </a:r>
-        </a:p>
-      </dsp:txBody>
-      <dsp:txXfrm>
-        <a:off x="3538574" y="2725540"/>
-        <a:ext cx="2981250" cy="720000"/>
-      </dsp:txXfrm>
-    </dsp:sp>
-    <dsp:sp modelId="{5BDDFF18-9AEC-4E5E-B9AA-33D86F01A63E}">
-      <dsp:nvSpPr>
-        <dsp:cNvPr id="0" name=""/>
-        <dsp:cNvSpPr/>
-      </dsp:nvSpPr>
-      <dsp:spPr>
-        <a:xfrm>
-          <a:off x="7622887" y="340539"/>
-          <a:ext cx="1818562" cy="1818562"/>
-        </a:xfrm>
-        <a:prstGeom prst="ellipse">
-          <a:avLst/>
-        </a:prstGeom>
-        <a:solidFill>
-          <a:schemeClr val="accent4">
-            <a:hueOff val="0"/>
-            <a:satOff val="0"/>
-            <a:lumOff val="0"/>
-            <a:alphaOff val="0"/>
-          </a:schemeClr>
-        </a:solidFill>
-        <a:ln>
-          <a:noFill/>
-        </a:ln>
-        <a:effectLst/>
-      </dsp:spPr>
-      <dsp:style>
-        <a:lnRef idx="0">
-          <a:scrgbClr r="0" g="0" b="0"/>
-        </a:lnRef>
-        <a:fillRef idx="1">
-          <a:scrgbClr r="0" g="0" b="0"/>
-        </a:fillRef>
-        <a:effectRef idx="0">
-          <a:scrgbClr r="0" g="0" b="0"/>
-        </a:effectRef>
-        <a:fontRef idx="minor"/>
-      </dsp:style>
-    </dsp:sp>
-    <dsp:sp modelId="{F09AEBFF-D2D3-4FFF-AD65-C3CEAEEB10F2}">
-      <dsp:nvSpPr>
-        <dsp:cNvPr id="0" name=""/>
-        <dsp:cNvSpPr/>
-      </dsp:nvSpPr>
-      <dsp:spPr>
-        <a:xfrm>
-          <a:off x="8010450" y="728102"/>
-          <a:ext cx="1043437" cy="1043437"/>
-        </a:xfrm>
-        <a:prstGeom prst="rect">
-          <a:avLst/>
-        </a:prstGeom>
-        <a:blipFill>
-          <a:blip xmlns:r="http://schemas.openxmlformats.org/officeDocument/2006/relationships" r:embed="rId5">
-            <a:extLst>
-              <a:ext uri="{28A0092B-C50C-407E-A947-70E740481C1C}">
-                <a14:useLocalDpi xmlns:a14="http://schemas.microsoft.com/office/drawing/2010/main" val="0"/>
-              </a:ext>
-              <a:ext uri="{96DAC541-7B7A-43D3-8B79-37D633B846F1}">
-                <asvg:svgBlip xmlns:asvg="http://schemas.microsoft.com/office/drawing/2016/SVG/main" r:embed="rId6"/>
-              </a:ext>
-            </a:extLst>
-          </a:blip>
-          <a:srcRect/>
-          <a:stretch>
-            <a:fillRect/>
-          </a:stretch>
-        </a:blipFill>
-        <a:ln w="12700" cap="flat" cmpd="sng" algn="ctr">
-          <a:noFill/>
-          <a:prstDash val="solid"/>
-        </a:ln>
-        <a:effectLst/>
-      </dsp:spPr>
-      <dsp:style>
-        <a:lnRef idx="2">
-          <a:scrgbClr r="0" g="0" b="0"/>
-        </a:lnRef>
-        <a:fillRef idx="1">
-          <a:scrgbClr r="0" g="0" b="0"/>
-        </a:fillRef>
-        <a:effectRef idx="0">
-          <a:scrgbClr r="0" g="0" b="0"/>
-        </a:effectRef>
-        <a:fontRef idx="minor">
-          <a:schemeClr val="lt1"/>
-        </a:fontRef>
-      </dsp:style>
-    </dsp:sp>
-    <dsp:sp modelId="{AB9CAFAA-6939-48A6-A89B-19D1A94B9EA1}">
-      <dsp:nvSpPr>
-        <dsp:cNvPr id="0" name=""/>
-        <dsp:cNvSpPr/>
-      </dsp:nvSpPr>
-      <dsp:spPr>
-        <a:xfrm>
-          <a:off x="7041543" y="2725540"/>
-          <a:ext cx="2981250" cy="720000"/>
-        </a:xfrm>
-        <a:prstGeom prst="rect">
-          <a:avLst/>
-        </a:prstGeom>
-        <a:noFill/>
-        <a:ln>
-          <a:noFill/>
-        </a:ln>
-        <a:effectLst/>
-      </dsp:spPr>
-      <dsp:style>
-        <a:lnRef idx="0">
-          <a:scrgbClr r="0" g="0" b="0"/>
-        </a:lnRef>
-        <a:fillRef idx="0">
-          <a:scrgbClr r="0" g="0" b="0"/>
-        </a:fillRef>
-        <a:effectRef idx="0">
-          <a:scrgbClr r="0" g="0" b="0"/>
-        </a:effectRef>
-        <a:fontRef idx="minor"/>
-      </dsp:style>
-      <dsp:txBody>
-        <a:bodyPr spcFirstLastPara="0" vert="horz" wrap="square" lIns="0" tIns="0" rIns="0" bIns="0" numCol="1" spcCol="1270" anchor="t" anchorCtr="0">
-          <a:noAutofit/>
-        </a:bodyPr>
-        <a:lstStyle/>
-        <a:p>
-          <a:pPr marL="0" lvl="0" indent="0" algn="ctr" defTabSz="1022350">
-            <a:lnSpc>
-              <a:spcPct val="100000"/>
-            </a:lnSpc>
-            <a:spcBef>
-              <a:spcPct val="0"/>
-            </a:spcBef>
-            <a:spcAft>
-              <a:spcPct val="35000"/>
-            </a:spcAft>
-            <a:buNone/>
-            <a:defRPr cap="all"/>
-          </a:pPr>
-          <a:r>
-            <a:rPr lang="en-US" sz="2300" kern="1200" dirty="0"/>
-            <a:t>Lorem Ipsum Dolor Sit Amet</a:t>
-          </a:r>
-        </a:p>
-      </dsp:txBody>
-      <dsp:txXfrm>
-        <a:off x="7041543" y="2725540"/>
-        <a:ext cx="2981250" cy="720000"/>
-      </dsp:txXfrm>
-    </dsp:sp>
-  </dsp:spTree>
-</dsp:drawing>
-</file>
-
-<file path=ppt/diagrams/layout1.xml><?xml version="1.0" encoding="utf-8"?>
-<dgm:layoutDef xmlns:dgm="http://schemas.openxmlformats.org/drawingml/2006/diagram" xmlns:a="http://schemas.openxmlformats.org/drawingml/2006/main" uniqueId="urn:microsoft.com/office/officeart/2018/5/layout/IconLeafLabelList">
-  <dgm:title val="Icon Leaf Label List"/>
-  <dgm:desc val="Use to show non-sequential or grouped chunks of information accompanied by a related visuals. Works best with icons or small pictures with short text captions."/>
-  <dgm:catLst>
-    <dgm:cat type="icon" pri="500"/>
-  </dgm:catLst>
-  <dgm:sampData useDef="1">
-    <dgm:dataModel>
-      <dgm:ptLst/>
-      <dgm:bg/>
-      <dgm:whole/>
-    </dgm:dataModel>
-  </dgm:sampData>
-  <dgm:styleData useDef="1">
-    <dgm:dataModel>
-      <dgm:ptLst/>
-      <dgm:bg/>
-      <dgm:whole/>
-    </dgm:dataModel>
-  </dgm:styleData>
-  <dgm:clrData useDef="1">
-    <dgm:dataModel>
-      <dgm:ptLst/>
-      <dgm:bg/>
-      <dgm:whole/>
-    </dgm:dataModel>
-  </dgm:clrData>
-  <dgm:layoutNode name="root">
-    <dgm:varLst>
-      <dgm:dir/>
-      <dgm:resizeHandles val="exact"/>
-    </dgm:varLst>
-    <dgm:choose name="Name0">
-      <dgm:if name="Name1" axis="self" func="var" arg="dir" op="equ" val="norm">
-        <dgm:alg type="snake">
-          <dgm:param type="grDir" val="tL"/>
-          <dgm:param type="flowDir" val="row"/>
-          <dgm:param type="contDir" val="sameDir"/>
-          <dgm:param type="off" val="ctr"/>
-          <dgm:param type="vertAlign" val="mid"/>
-          <dgm:param type="horzAlign" val="ctr"/>
-        </dgm:alg>
-      </dgm:if>
-      <dgm:else name="Name2">
-        <dgm:alg type="snake">
-          <dgm:param type="grDir" val="tR"/>
-          <dgm:param type="flowDir" val="row"/>
-          <dgm:param type="contDir" val="sameDir"/>
-          <dgm:param type="off" val="ctr"/>
-          <dgm:param type="vertAlign" val="mid"/>
-          <dgm:param type="horzAlign" val="ctr"/>
-        </dgm:alg>
-      </dgm:else>
-    </dgm:choose>
-    <dgm:shape xmlns:r="http://schemas.openxmlformats.org/officeDocument/2006/relationships" r:blip="">
-      <dgm:adjLst/>
-    </dgm:shape>
-    <dgm:presOf/>
-    <dgm:choose name="Name3">
-      <dgm:if name="Name4" axis="ch" ptType="node" func="cnt" op="lte" val="2">
-        <dgm:constrLst>
-          <dgm:constr type="h" for="ch" forName="compNode" refType="h" fact="0.4"/>
-          <dgm:constr type="w" for="ch" forName="compNode" val="100"/>
-          <dgm:constr type="w" for="ch" forName="sibTrans" refType="w" refFor="ch" refForName="compNode" fact="0.175"/>
-          <dgm:constr type="sp" refType="w" refFor="ch" refForName="compNode" op="equ" fact="0.25"/>
-          <dgm:constr type="primFontSz" for="des" ptType="node" op="equ" val="44"/>
-          <dgm:constr type="h" for="des" forName="compNode" op="equ"/>
-          <dgm:constr type="h" for="des" forName="textRect" op="equ"/>
-        </dgm:constrLst>
-      </dgm:if>
-      <dgm:if name="Name5" axis="ch" ptType="node" func="cnt" op="lte" val="3">
-        <dgm:constrLst>
-          <dgm:constr type="h" for="ch" forName="compNode" refType="h" fact="0.4"/>
-          <dgm:constr type="w" for="ch" forName="compNode" val="100"/>
-          <dgm:constr type="w" for="ch" forName="sibTrans" refType="w" refFor="ch" refForName="compNode" fact="0.175"/>
-          <dgm:constr type="sp" refType="w" refFor="ch" refForName="compNode" op="equ" fact="0.25"/>
-          <dgm:constr type="primFontSz" for="des" ptType="node" op="equ" val="40"/>
-          <dgm:constr type="h" for="des" forName="compNode" op="equ"/>
-          <dgm:constr type="h" for="des" forName="textRect" op="equ"/>
-        </dgm:constrLst>
-      </dgm:if>
-      <dgm:if name="Name6" axis="ch" ptType="node" func="cnt" op="lte" val="4">
-        <dgm:constrLst>
-          <dgm:constr type="h" for="ch" forName="compNode" refType="h" fact="0.4"/>
-          <dgm:constr type="w" for="ch" forName="compNode" refType="w"/>
-          <dgm:constr type="w" for="ch" forName="sibTrans" refType="w" refFor="ch" refForName="compNode" fact="0.175"/>
-          <dgm:constr type="sp" refType="w" refFor="ch" refForName="compNode" op="equ" fact="0.25"/>
-          <dgm:constr type="primFontSz" for="des" ptType="node" op="equ" val="32"/>
-          <dgm:constr type="h" for="des" forName="compNode" op="equ"/>
-          <dgm:constr type="h" for="des" forName="textRect" op="equ"/>
-        </dgm:constrLst>
-      </dgm:if>
-      <dgm:else name="Name7">
-        <dgm:constrLst>
-          <dgm:constr type="h" for="ch" forName="compNode" refType="h" fact="0.4"/>
-          <dgm:constr type="w" for="ch" forName="compNode" refType="w"/>
-          <dgm:constr type="w" for="ch" forName="sibTrans" refType="w" refFor="ch" refForName="compNode" fact="0.175"/>
-          <dgm:constr type="sp" refType="w" refFor="ch" refForName="compNode" op="equ" fact="0.25"/>
-          <dgm:constr type="primFontSz" for="des" ptType="node" op="equ" val="24"/>
-          <dgm:constr type="h" for="des" forName="compNode" op="equ"/>
-          <dgm:constr type="h" for="des" forName="textRect" op="equ"/>
-        </dgm:constrLst>
-      </dgm:else>
-    </dgm:choose>
-    <dgm:ruleLst>
-      <dgm:rule type="w" for="ch" forName="compNode" val="50" fact="NaN" max="NaN"/>
-    </dgm:ruleLst>
-    <dgm:forEach name="Name8" axis="ch" ptType="node">
-      <dgm:layoutNode name="compNode">
-        <dgm:alg type="composite"/>
-        <dgm:shape xmlns:r="http://schemas.openxmlformats.org/officeDocument/2006/relationships" r:blip="">
-          <dgm:adjLst/>
-        </dgm:shape>
-        <dgm:presOf axis="self"/>
-        <dgm:constrLst>
-          <dgm:constr type="w" for="ch" forName="iconBgRect" refType="w" fact="0.61"/>
-          <dgm:constr type="h" for="ch" forName="iconBgRect" refType="w" refFor="ch" refForName="iconBgRect"/>
-          <dgm:constr type="t" for="ch" forName="iconBgRect"/>
-          <dgm:constr type="ctrX" for="ch" forName="iconBgRect" refType="w" fact="0.5"/>
-          <dgm:constr type="w" for="ch" forName="iconRect" refType="w" fact="0.35"/>
-          <dgm:constr type="h" for="ch" forName="iconRect" refType="w" refFor="ch" refForName="iconRect"/>
-          <dgm:constr type="ctrX" for="ch" forName="iconRect" refType="ctrX" refFor="ch" refForName="iconBgRect"/>
-          <dgm:constr type="ctrY" for="ch" forName="iconRect" refType="ctrY" refFor="ch" refForName="iconBgRect"/>
-          <dgm:constr type="h" for="ch" forName="spaceRect" refType="w" fact="0.19"/>
-          <dgm:constr type="w" for="ch" forName="spaceRect" refType="w"/>
-          <dgm:constr type="l" for="ch" forName="spaceRect"/>
-          <dgm:constr type="t" for="ch" forName="spaceRect" refType="b" refFor="ch" refForName="iconBgRect"/>
-          <dgm:constr type="h" for="ch" forName="textRect" val="20"/>
-          <dgm:constr type="w" for="ch" forName="textRect" refType="w"/>
-          <dgm:constr type="l" for="ch" forName="textRect"/>
-          <dgm:constr type="t" for="ch" forName="textRect" refType="b" refFor="ch" refForName="spaceRect"/>
-        </dgm:constrLst>
-        <dgm:ruleLst>
-          <dgm:rule type="h" val="INF" fact="NaN" max="NaN"/>
-        </dgm:ruleLst>
-        <dgm:layoutNode name="iconBgRect" styleLbl="bgShp">
-          <dgm:alg type="sp"/>
-          <dgm:shape xmlns:r="http://schemas.openxmlformats.org/officeDocument/2006/relationships" type="round2DiagRect" r:blip="">
-            <dgm:adjLst/>
-            <dgm:extLst>
-              <a:ext uri="{B698B0E9-8C71-41B9-8309-B3DCBF30829C}">
-                <dgm1612:spPr xmlns:dgm1612="http://schemas.microsoft.com/office/drawing/2016/12/diagram">
-                  <a:prstGeom prst="round2DiagRect">
-                    <a:avLst>
-                      <a:gd name="adj1" fmla="val 29727"/>
-                      <a:gd name="adj2" fmla="val 0"/>
-                    </a:avLst>
-                  </a:prstGeom>
-                </dgm1612:spPr>
-              </a:ext>
-            </dgm:extLst>
-          </dgm:shape>
-          <dgm:presOf/>
-          <dgm:constrLst/>
-          <dgm:ruleLst/>
-        </dgm:layoutNode>
-        <dgm:layoutNode name="iconRect" styleLbl="node1">
-          <dgm:alg type="sp"/>
-          <dgm:shape xmlns:r="http://schemas.openxmlformats.org/officeDocument/2006/relationships" type="rect" r:blip="" blipPhldr="1">
-            <dgm:adjLst/>
-          </dgm:shape>
-          <dgm:presOf/>
-          <dgm:constrLst/>
-          <dgm:ruleLst/>
-        </dgm:layoutNode>
-        <dgm:layoutNode name="spaceRect">
-          <dgm:alg type="sp"/>
-          <dgm:shape xmlns:r="http://schemas.openxmlformats.org/officeDocument/2006/relationships" r:blip="">
-            <dgm:adjLst/>
-          </dgm:shape>
-          <dgm:presOf/>
-          <dgm:constrLst/>
-          <dgm:ruleLst/>
-        </dgm:layoutNode>
-        <dgm:layoutNode name="textRect" styleLbl="revTx">
-          <dgm:varLst>
-            <dgm:chMax val="1"/>
-            <dgm:chPref val="1"/>
-          </dgm:varLst>
-          <dgm:alg type="tx">
-            <dgm:param type="txAnchorVert" val="t"/>
-          </dgm:alg>
-          <dgm:shape xmlns:r="http://schemas.openxmlformats.org/officeDocument/2006/relationships" type="rect" r:blip="">
-            <dgm:adjLst/>
-          </dgm:shape>
-          <dgm:presOf axis="self" ptType="node"/>
-          <dgm:constrLst>
-            <dgm:constr type="lMarg"/>
-            <dgm:constr type="rMarg"/>
-            <dgm:constr type="tMarg"/>
-            <dgm:constr type="bMarg"/>
-          </dgm:constrLst>
-          <dgm:ruleLst>
-            <dgm:rule type="primFontSz" val="11" fact="NaN" max="NaN"/>
-            <dgm:rule type="h" val="INF" fact="NaN" max="NaN"/>
-          </dgm:ruleLst>
-        </dgm:layoutNode>
-      </dgm:layoutNode>
-      <dgm:forEach name="Name9" axis="followSib" ptType="sibTrans" cnt="1">
-        <dgm:layoutNode name="sibTrans">
-          <dgm:alg type="sp"/>
-          <dgm:shape xmlns:r="http://schemas.openxmlformats.org/officeDocument/2006/relationships" r:blip="">
-            <dgm:adjLst/>
-          </dgm:shape>
-          <dgm:presOf axis="self"/>
-          <dgm:constrLst/>
-          <dgm:ruleLst/>
-        </dgm:layoutNode>
-      </dgm:forEach>
-    </dgm:forEach>
-  </dgm:layoutNode>
-  <dgm:extLst>
-    <a:ext uri="{68A01E43-0DF5-4B5B-8FA6-DAF915123BFB}">
-      <dgm1612:lstStyle xmlns:dgm1612="http://schemas.microsoft.com/office/drawing/2016/12/diagram">
-        <a:lvl1pPr>
-          <a:lnSpc>
-            <a:spcPct val="100000"/>
-          </a:lnSpc>
-          <a:defRPr cap="all"/>
-        </a:lvl1pPr>
-      </dgm1612:lstStyle>
-    </a:ext>
-  </dgm:extLst>
-</dgm:layoutDef>
-</file>
-
-<file path=ppt/diagrams/quickStyle1.xml><?xml version="1.0" encoding="utf-8"?>
-<dgm:styleDef xmlns:dgm="http://schemas.openxmlformats.org/drawingml/2006/diagram" xmlns:a="http://schemas.openxmlformats.org/drawingml/2006/main" uniqueId="urn:microsoft.com/office/officeart/2005/8/quickstyle/simple1">
-  <dgm:title val=""/>
-  <dgm:desc val=""/>
-  <dgm:catLst>
-    <dgm:cat type="simple" pri="10100"/>
-  </dgm:catLst>
-  <dgm:scene3d>
-    <a:camera prst="orthographicFront"/>
-    <a:lightRig rig="threePt" dir="t"/>
-  </dgm:scene3d>
-  <dgm:styleLbl name="node0">
-    <dgm:scene3d>
-      <a:camera prst="orthographicFront"/>
-      <a:lightRig rig="threePt" dir="t"/>
-    </dgm:scene3d>
-    <dgm:sp3d/>
-    <dgm:txPr/>
-    <dgm:style>
-      <a:lnRef idx="2">
-        <a:scrgbClr r="0" g="0" b="0"/>
-      </a:lnRef>
-      <a:fillRef idx="1">
-        <a:scrgbClr r="0" g="0" b="0"/>
-      </a:fillRef>
-      <a:effectRef idx="0">
-        <a:scrgbClr r="0" g="0" b="0"/>
-      </a:effectRef>
-      <a:fontRef idx="minor">
-        <a:schemeClr val="lt1"/>
-      </a:fontRef>
-    </dgm:style>
-  </dgm:styleLbl>
-  <dgm:styleLbl name="lnNode1">
-    <dgm:scene3d>
-      <a:camera prst="orthographicFront"/>
-      <a:lightRig rig="threePt" dir="t"/>
-    </dgm:scene3d>
-    <dgm:sp3d/>
-    <dgm:txPr/>
-    <dgm:style>
-      <a:lnRef idx="2">
-        <a:scrgbClr r="0" g="0" b="0"/>
-      </a:lnRef>
-      <a:fillRef idx="1">
-        <a:scrgbClr r="0" g="0" b="0"/>
-      </a:fillRef>
-      <a:effectRef idx="0">
-        <a:scrgbClr r="0" g="0" b="0"/>
-      </a:effectRef>
-      <a:fontRef idx="minor">
-        <a:schemeClr val="lt1"/>
-      </a:fontRef>
-    </dgm:style>
-  </dgm:styleLbl>
-  <dgm:styleLbl name="vennNode1">
-    <dgm:scene3d>
-      <a:camera prst="orthographicFront"/>
-      <a:lightRig rig="threePt" dir="t"/>
-    </dgm:scene3d>
-    <dgm:sp3d/>
-    <dgm:txPr/>
-    <dgm:style>
-      <a:lnRef idx="2">
-        <a:scrgbClr r="0" g="0" b="0"/>
-      </a:lnRef>
-      <a:fillRef idx="1">
-        <a:scrgbClr r="0" g="0" b="0"/>
-      </a:fillRef>
-      <a:effectRef idx="0">
-        <a:scrgbClr r="0" g="0" b="0"/>
-      </a:effectRef>
-      <a:fontRef idx="minor">
-        <a:schemeClr val="tx1"/>
-      </a:fontRef>
-    </dgm:style>
-  </dgm:styleLbl>
-  <dgm:styleLbl name="alignNode1">
-    <dgm:scene3d>
-      <a:camera prst="orthographicFront"/>
-      <a:lightRig rig="threePt" dir="t"/>
-    </dgm:scene3d>
-    <dgm:sp3d/>
-    <dgm:txPr/>
-    <dgm:style>
-      <a:lnRef idx="2">
-        <a:scrgbClr r="0" g="0" b="0"/>
-      </a:lnRef>
-      <a:fillRef idx="1">
-        <a:scrgbClr r="0" g="0" b="0"/>
-      </a:fillRef>
-      <a:effectRef idx="0">
-        <a:scrgbClr r="0" g="0" b="0"/>
-      </a:effectRef>
-      <a:fontRef idx="minor">
-        <a:schemeClr val="lt1"/>
-      </a:fontRef>
-    </dgm:style>
-  </dgm:styleLbl>
-  <dgm:styleLbl name="node1">
-    <dgm:scene3d>
-      <a:camera prst="orthographicFront"/>
-      <a:lightRig rig="threePt" dir="t"/>
-    </dgm:scene3d>
-    <dgm:sp3d/>
-    <dgm:txPr/>
-    <dgm:style>
-      <a:lnRef idx="2">
-        <a:scrgbClr r="0" g="0" b="0"/>
-      </a:lnRef>
-      <a:fillRef idx="1">
-        <a:scrgbClr r="0" g="0" b="0"/>
-      </a:fillRef>
-      <a:effectRef idx="0">
-        <a:scrgbClr r="0" g="0" b="0"/>
-      </a:effectRef>
-      <a:fontRef idx="minor">
-        <a:schemeClr val="lt1"/>
-      </a:fontRef>
-    </dgm:style>
-  </dgm:styleLbl>
-  <dgm:styleLbl name="node2">
-    <dgm:scene3d>
-      <a:camera prst="orthographicFront"/>
-      <a:lightRig rig="threePt" dir="t"/>
-    </dgm:scene3d>
-    <dgm:sp3d/>
-    <dgm:txPr/>
-    <dgm:style>
-      <a:lnRef idx="2">
-        <a:scrgbClr r="0" g="0" b="0"/>
-      </a:lnRef>
-      <a:fillRef idx="1">
-        <a:scrgbClr r="0" g="0" b="0"/>
-      </a:fillRef>
-      <a:effectRef idx="0">
-        <a:scrgbClr r="0" g="0" b="0"/>
-      </a:effectRef>
-      <a:fontRef idx="minor">
-        <a:schemeClr val="lt1"/>
-      </a:fontRef>
-    </dgm:style>
-  </dgm:styleLbl>
-  <dgm:styleLbl name="node3">
-    <dgm:scene3d>
-      <a:camera prst="orthographicFront"/>
-      <a:lightRig rig="threePt" dir="t"/>
-    </dgm:scene3d>
-    <dgm:sp3d/>
-    <dgm:txPr/>
-    <dgm:style>
-      <a:lnRef idx="2">
-        <a:scrgbClr r="0" g="0" b="0"/>
-      </a:lnRef>
-      <a:fillRef idx="1">
-        <a:scrgbClr r="0" g="0" b="0"/>
-      </a:fillRef>
-      <a:effectRef idx="0">
-        <a:scrgbClr r="0" g="0" b="0"/>
-      </a:effectRef>
-      <a:fontRef idx="minor">
-        <a:schemeClr val="lt1"/>
-      </a:fontRef>
-    </dgm:style>
-  </dgm:styleLbl>
-  <dgm:styleLbl name="node4">
-    <dgm:scene3d>
-      <a:camera prst="orthographicFront"/>
-      <a:lightRig rig="threePt" dir="t"/>
-    </dgm:scene3d>
-    <dgm:sp3d/>
-    <dgm:txPr/>
-    <dgm:style>
-      <a:lnRef idx="2">
-        <a:scrgbClr r="0" g="0" b="0"/>
-      </a:lnRef>
-      <a:fillRef idx="1">
-        <a:scrgbClr r="0" g="0" b="0"/>
-      </a:fillRef>
-      <a:effectRef idx="0">
-        <a:scrgbClr r="0" g="0" b="0"/>
-      </a:effectRef>
-      <a:fontRef idx="minor">
-        <a:schemeClr val="lt1"/>
-      </a:fontRef>
-    </dgm:style>
-  </dgm:styleLbl>
-  <dgm:styleLbl name="fgImgPlace1">
-    <dgm:scene3d>
-      <a:camera prst="orthographicFront"/>
-      <a:lightRig rig="threePt" dir="t"/>
-    </dgm:scene3d>
-    <dgm:sp3d/>
-    <dgm:txPr/>
-    <dgm:style>
-      <a:lnRef idx="2">
-        <a:scrgbClr r="0" g="0" b="0"/>
-      </a:lnRef>
-      <a:fillRef idx="1">
-        <a:scrgbClr r="0" g="0" b="0"/>
-      </a:fillRef>
-      <a:effectRef idx="0">
-        <a:scrgbClr r="0" g="0" b="0"/>
-      </a:effectRef>
-      <a:fontRef idx="minor"/>
-    </dgm:style>
-  </dgm:styleLbl>
-  <dgm:styleLbl name="alignImgPlace1">
-    <dgm:scene3d>
-      <a:camera prst="orthographicFront"/>
-      <a:lightRig rig="threePt" dir="t"/>
-    </dgm:scene3d>
-    <dgm:sp3d/>
-    <dgm:txPr/>
-    <dgm:style>
-      <a:lnRef idx="2">
-        <a:scrgbClr r="0" g="0" b="0"/>
-      </a:lnRef>
-      <a:fillRef idx="1">
-        <a:scrgbClr r="0" g="0" b="0"/>
-      </a:fillRef>
-      <a:effectRef idx="0">
-        <a:scrgbClr r="0" g="0" b="0"/>
-      </a:effectRef>
-      <a:fontRef idx="minor"/>
-    </dgm:style>
-  </dgm:styleLbl>
-  <dgm:styleLbl name="bgImgPlace1">
-    <dgm:scene3d>
-      <a:camera prst="orthographicFront"/>
-      <a:lightRig rig="threePt" dir="t"/>
-    </dgm:scene3d>
-    <dgm:sp3d/>
-    <dgm:txPr/>
-    <dgm:style>
-      <a:lnRef idx="2">
-        <a:scrgbClr r="0" g="0" b="0"/>
-      </a:lnRef>
-      <a:fillRef idx="1">
-        <a:scrgbClr r="0" g="0" b="0"/>
-      </a:fillRef>
-      <a:effectRef idx="0">
-        <a:scrgbClr r="0" g="0" b="0"/>
-      </a:effectRef>
-      <a:fontRef idx="minor"/>
-    </dgm:style>
-  </dgm:styleLbl>
-  <dgm:styleLbl name="sibTrans2D1">
-    <dgm:scene3d>
-      <a:camera prst="orthographicFront"/>
-      <a:lightRig rig="threePt" dir="t"/>
-    </dgm:scene3d>
-    <dgm:sp3d/>
-    <dgm:txPr/>
-    <dgm:style>
-      <a:lnRef idx="0">
-        <a:scrgbClr r="0" g="0" b="0"/>
-      </a:lnRef>
-      <a:fillRef idx="1">
-        <a:scrgbClr r="0" g="0" b="0"/>
-      </a:fillRef>
-      <a:effectRef idx="0">
-        <a:scrgbClr r="0" g="0" b="0"/>
-      </a:effectRef>
-      <a:fontRef idx="minor">
-        <a:schemeClr val="lt1"/>
-      </a:fontRef>
-    </dgm:style>
-  </dgm:styleLbl>
-  <dgm:styleLbl name="fgSibTrans2D1">
-    <dgm:scene3d>
-      <a:camera prst="orthographicFront"/>
-      <a:lightRig rig="threePt" dir="t"/>
-    </dgm:scene3d>
-    <dgm:sp3d/>
-    <dgm:txPr/>
-    <dgm:style>
-      <a:lnRef idx="0">
-        <a:scrgbClr r="0" g="0" b="0"/>
-      </a:lnRef>
-      <a:fillRef idx="1">
-        <a:scrgbClr r="0" g="0" b="0"/>
-      </a:fillRef>
-      <a:effectRef idx="0">
-        <a:scrgbClr r="0" g="0" b="0"/>
-      </a:effectRef>
-      <a:fontRef idx="minor">
-        <a:schemeClr val="lt1"/>
-      </a:fontRef>
-    </dgm:style>
-  </dgm:styleLbl>
-  <dgm:styleLbl name="bgSibTrans2D1">
-    <dgm:scene3d>
-      <a:camera prst="orthographicFront"/>
-      <a:lightRig rig="threePt" dir="t"/>
-    </dgm:scene3d>
-    <dgm:sp3d/>
-    <dgm:txPr/>
-    <dgm:style>
-      <a:lnRef idx="0">
-        <a:scrgbClr r="0" g="0" b="0"/>
-      </a:lnRef>
-      <a:fillRef idx="1">
-        <a:scrgbClr r="0" g="0" b="0"/>
-      </a:fillRef>
-      <a:effectRef idx="0">
-        <a:scrgbClr r="0" g="0" b="0"/>
-      </a:effectRef>
-      <a:fontRef idx="minor">
-        <a:schemeClr val="lt1"/>
-      </a:fontRef>
-    </dgm:style>
-  </dgm:styleLbl>
-  <dgm:styleLbl name="sibTrans1D1">
-    <dgm:scene3d>
-      <a:camera prst="orthographicFront"/>
-      <a:lightRig rig="threePt" dir="t"/>
-    </dgm:scene3d>
-    <dgm:sp3d/>
-    <dgm:txPr/>
-    <dgm:style>
-      <a:lnRef idx="1">
-        <a:scrgbClr r="0" g="0" b="0"/>
-      </a:lnRef>
-      <a:fillRef idx="0">
-        <a:scrgbClr r="0" g="0" b="0"/>
-      </a:fillRef>
-      <a:effectRef idx="0">
-        <a:scrgbClr r="0" g="0" b="0"/>
-      </a:effectRef>
-      <a:fontRef idx="minor"/>
-    </dgm:style>
-  </dgm:styleLbl>
-  <dgm:styleLbl name="callout">
-    <dgm:scene3d>
-      <a:camera prst="orthographicFront"/>
-      <a:lightRig rig="threePt" dir="t"/>
-    </dgm:scene3d>
-    <dgm:sp3d/>
-    <dgm:txPr/>
-    <dgm:style>
-      <a:lnRef idx="2">
-        <a:scrgbClr r="0" g="0" b="0"/>
-      </a:lnRef>
-      <a:fillRef idx="1">
-        <a:scrgbClr r="0" g="0" b="0"/>
-      </a:fillRef>
-      <a:effectRef idx="0">
-        <a:scrgbClr r="0" g="0" b="0"/>
-      </a:effectRef>
-      <a:fontRef idx="minor"/>
-    </dgm:style>
-  </dgm:styleLbl>
-  <dgm:styleLbl name="asst0">
-    <dgm:scene3d>
-      <a:camera prst="orthographicFront"/>
-      <a:lightRig rig="threePt" dir="t"/>
-    </dgm:scene3d>
-    <dgm:sp3d/>
-    <dgm:txPr/>
-    <dgm:style>
-      <a:lnRef idx="2">
-        <a:scrgbClr r="0" g="0" b="0"/>
-      </a:lnRef>
-      <a:fillRef idx="1">
-        <a:scrgbClr r="0" g="0" b="0"/>
-      </a:fillRef>
-      <a:effectRef idx="0">
-        <a:scrgbClr r="0" g="0" b="0"/>
-      </a:effectRef>
-      <a:fontRef idx="minor">
-        <a:schemeClr val="lt1"/>
-      </a:fontRef>
-    </dgm:style>
-  </dgm:styleLbl>
-  <dgm:styleLbl name="asst1">
-    <dgm:scene3d>
-      <a:camera prst="orthographicFront"/>
-      <a:lightRig rig="threePt" dir="t"/>
-    </dgm:scene3d>
-    <dgm:sp3d/>
-    <dgm:txPr/>
-    <dgm:style>
-      <a:lnRef idx="2">
-        <a:scrgbClr r="0" g="0" b="0"/>
-      </a:lnRef>
-      <a:fillRef idx="1">
-        <a:scrgbClr r="0" g="0" b="0"/>
-      </a:fillRef>
-      <a:effectRef idx="0">
-        <a:scrgbClr r="0" g="0" b="0"/>
-      </a:effectRef>
-      <a:fontRef idx="minor">
-        <a:schemeClr val="lt1"/>
-      </a:fontRef>
-    </dgm:style>
-  </dgm:styleLbl>
-  <dgm:styleLbl name="asst2">
-    <dgm:scene3d>
-      <a:camera prst="orthographicFront"/>
-      <a:lightRig rig="threePt" dir="t"/>
-    </dgm:scene3d>
-    <dgm:sp3d/>
-    <dgm:txPr/>
-    <dgm:style>
-      <a:lnRef idx="2">
-        <a:scrgbClr r="0" g="0" b="0"/>
-      </a:lnRef>
-      <a:fillRef idx="1">
-        <a:scrgbClr r="0" g="0" b="0"/>
-      </a:fillRef>
-      <a:effectRef idx="0">
-        <a:scrgbClr r="0" g="0" b="0"/>
-      </a:effectRef>
-      <a:fontRef idx="minor">
-        <a:schemeClr val="lt1"/>
-      </a:fontRef>
-    </dgm:style>
-  </dgm:styleLbl>
-  <dgm:styleLbl name="asst3">
-    <dgm:scene3d>
-      <a:camera prst="orthographicFront"/>
-      <a:lightRig rig="threePt" dir="t"/>
-    </dgm:scene3d>
-    <dgm:sp3d/>
-    <dgm:txPr/>
-    <dgm:style>
-      <a:lnRef idx="2">
-        <a:scrgbClr r="0" g="0" b="0"/>
-      </a:lnRef>
-      <a:fillRef idx="1">
-        <a:scrgbClr r="0" g="0" b="0"/>
-      </a:fillRef>
-      <a:effectRef idx="0">
-        <a:scrgbClr r="0" g="0" b="0"/>
-      </a:effectRef>
-      <a:fontRef idx="minor">
-        <a:schemeClr val="lt1"/>
-      </a:fontRef>
-    </dgm:style>
-  </dgm:styleLbl>
-  <dgm:styleLbl name="asst4">
-    <dgm:scene3d>
-      <a:camera prst="orthographicFront"/>
-      <a:lightRig rig="threePt" dir="t"/>
-    </dgm:scene3d>
-    <dgm:sp3d/>
-    <dgm:txPr/>
-    <dgm:style>
-      <a:lnRef idx="2">
-        <a:scrgbClr r="0" g="0" b="0"/>
-      </a:lnRef>
-      <a:fillRef idx="1">
-        <a:scrgbClr r="0" g="0" b="0"/>
-      </a:fillRef>
-      <a:effectRef idx="0">
-        <a:scrgbClr r="0" g="0" b="0"/>
-      </a:effectRef>
-      <a:fontRef idx="minor">
-        <a:schemeClr val="lt1"/>
-      </a:fontRef>
-    </dgm:style>
-  </dgm:styleLbl>
-  <dgm:styleLbl name="parChTrans2D1">
-    <dgm:scene3d>
-      <a:camera prst="orthographicFront"/>
-      <a:lightRig rig="threePt" dir="t"/>
-    </dgm:scene3d>
-    <dgm:sp3d/>
-    <dgm:txPr/>
-    <dgm:style>
-      <a:lnRef idx="2">
-        <a:scrgbClr r="0" g="0" b="0"/>
-      </a:lnRef>
-      <a:fillRef idx="1">
-        <a:scrgbClr r="0" g="0" b="0"/>
-      </a:fillRef>
-      <a:effectRef idx="0">
-        <a:scrgbClr r="0" g="0" b="0"/>
-      </a:effectRef>
-      <a:fontRef idx="minor">
-        <a:schemeClr val="lt1"/>
-      </a:fontRef>
-    </dgm:style>
-  </dgm:styleLbl>
-  <dgm:styleLbl name="parChTrans2D2">
-    <dgm:scene3d>
-      <a:camera prst="orthographicFront"/>
-      <a:lightRig rig="threePt" dir="t"/>
-    </dgm:scene3d>
-    <dgm:sp3d/>
-    <dgm:txPr/>
-    <dgm:style>
-      <a:lnRef idx="2">
-        <a:scrgbClr r="0" g="0" b="0"/>
-      </a:lnRef>
-      <a:fillRef idx="1">
-        <a:scrgbClr r="0" g="0" b="0"/>
-      </a:fillRef>
-      <a:effectRef idx="0">
-        <a:scrgbClr r="0" g="0" b="0"/>
-      </a:effectRef>
-      <a:fontRef idx="minor">
-        <a:schemeClr val="lt1"/>
-      </a:fontRef>
-    </dgm:style>
-  </dgm:styleLbl>
-  <dgm:styleLbl name="parChTrans2D3">
-    <dgm:scene3d>
-      <a:camera prst="orthographicFront"/>
-      <a:lightRig rig="threePt" dir="t"/>
-    </dgm:scene3d>
-    <dgm:sp3d/>
-    <dgm:txPr/>
-    <dgm:style>
-      <a:lnRef idx="2">
-        <a:scrgbClr r="0" g="0" b="0"/>
-      </a:lnRef>
-      <a:fillRef idx="1">
-        <a:scrgbClr r="0" g="0" b="0"/>
-      </a:fillRef>
-      <a:effectRef idx="0">
-        <a:scrgbClr r="0" g="0" b="0"/>
-      </a:effectRef>
-      <a:fontRef idx="minor">
-        <a:schemeClr val="lt1"/>
-      </a:fontRef>
-    </dgm:style>
-  </dgm:styleLbl>
-  <dgm:styleLbl name="parChTrans2D4">
-    <dgm:scene3d>
-      <a:camera prst="orthographicFront"/>
-      <a:lightRig rig="threePt" dir="t"/>
-    </dgm:scene3d>
-    <dgm:sp3d/>
-    <dgm:txPr/>
-    <dgm:style>
-      <a:lnRef idx="2">
-        <a:scrgbClr r="0" g="0" b="0"/>
-      </a:lnRef>
-      <a:fillRef idx="1">
-        <a:scrgbClr r="0" g="0" b="0"/>
-      </a:fillRef>
-      <a:effectRef idx="0">
-        <a:scrgbClr r="0" g="0" b="0"/>
-      </a:effectRef>
-      <a:fontRef idx="minor">
-        <a:schemeClr val="lt1"/>
-      </a:fontRef>
-    </dgm:style>
-  </dgm:styleLbl>
-  <dgm:styleLbl name="parChTrans1D1">
-    <dgm:scene3d>
-      <a:camera prst="orthographicFront"/>
-      <a:lightRig rig="threePt" dir="t"/>
-    </dgm:scene3d>
-    <dgm:sp3d/>
-    <dgm:txPr/>
-    <dgm:style>
-      <a:lnRef idx="2">
-        <a:scrgbClr r="0" g="0" b="0"/>
-      </a:lnRef>
-      <a:fillRef idx="0">
-        <a:scrgbClr r="0" g="0" b="0"/>
-      </a:fillRef>
-      <a:effectRef idx="0">
-        <a:scrgbClr r="0" g="0" b="0"/>
-      </a:effectRef>
-      <a:fontRef idx="minor"/>
-    </dgm:style>
-  </dgm:styleLbl>
-  <dgm:styleLbl name="parChTrans1D2">
-    <dgm:scene3d>
-      <a:camera prst="orthographicFront"/>
-      <a:lightRig rig="threePt" dir="t"/>
-    </dgm:scene3d>
-    <dgm:sp3d/>
-    <dgm:txPr/>
-    <dgm:style>
-      <a:lnRef idx="2">
-        <a:scrgbClr r="0" g="0" b="0"/>
-      </a:lnRef>
-      <a:fillRef idx="0">
-        <a:scrgbClr r="0" g="0" b="0"/>
-      </a:fillRef>
-      <a:effectRef idx="0">
-        <a:scrgbClr r="0" g="0" b="0"/>
-      </a:effectRef>
-      <a:fontRef idx="minor"/>
-    </dgm:style>
-  </dgm:styleLbl>
-  <dgm:styleLbl name="parChTrans1D3">
-    <dgm:scene3d>
-      <a:camera prst="orthographicFront"/>
-      <a:lightRig rig="threePt" dir="t"/>
-    </dgm:scene3d>
-    <dgm:sp3d/>
-    <dgm:txPr/>
-    <dgm:style>
-      <a:lnRef idx="2">
-        <a:scrgbClr r="0" g="0" b="0"/>
-      </a:lnRef>
-      <a:fillRef idx="0">
-        <a:scrgbClr r="0" g="0" b="0"/>
-      </a:fillRef>
-      <a:effectRef idx="0">
-        <a:scrgbClr r="0" g="0" b="0"/>
-      </a:effectRef>
-      <a:fontRef idx="minor"/>
-    </dgm:style>
-  </dgm:styleLbl>
-  <dgm:styleLbl name="parChTrans1D4">
-    <dgm:scene3d>
-      <a:camera prst="orthographicFront"/>
-      <a:lightRig rig="threePt" dir="t"/>
-    </dgm:scene3d>
-    <dgm:sp3d/>
-    <dgm:txPr/>
-    <dgm:style>
-      <a:lnRef idx="2">
-        <a:scrgbClr r="0" g="0" b="0"/>
-      </a:lnRef>
-      <a:fillRef idx="0">
-        <a:scrgbClr r="0" g="0" b="0"/>
-      </a:fillRef>
-      <a:effectRef idx="0">
-        <a:scrgbClr r="0" g="0" b="0"/>
-      </a:effectRef>
-      <a:fontRef idx="minor"/>
-    </dgm:style>
-  </dgm:styleLbl>
-  <dgm:styleLbl name="fgAcc1">
-    <dgm:scene3d>
-      <a:camera prst="orthographicFront"/>
-      <a:lightRig rig="threePt" dir="t"/>
-    </dgm:scene3d>
-    <dgm:sp3d/>
-    <dgm:txPr/>
-    <dgm:style>
-      <a:lnRef idx="2">
-        <a:scrgbClr r="0" g="0" b="0"/>
-      </a:lnRef>
-      <a:fillRef idx="1">
-        <a:scrgbClr r="0" g="0" b="0"/>
-      </a:fillRef>
-      <a:effectRef idx="0">
-        <a:scrgbClr r="0" g="0" b="0"/>
-      </a:effectRef>
-      <a:fontRef idx="minor"/>
-    </dgm:style>
-  </dgm:styleLbl>
-  <dgm:styleLbl name="conFgAcc1">
-    <dgm:scene3d>
-      <a:camera prst="orthographicFront"/>
-      <a:lightRig rig="threePt" dir="t"/>
-    </dgm:scene3d>
-    <dgm:sp3d/>
-    <dgm:txPr/>
-    <dgm:style>
-      <a:lnRef idx="2">
-        <a:scrgbClr r="0" g="0" b="0"/>
-      </a:lnRef>
-      <a:fillRef idx="1">
-        <a:scrgbClr r="0" g="0" b="0"/>
-      </a:fillRef>
-      <a:effectRef idx="0">
-        <a:scrgbClr r="0" g="0" b="0"/>
-      </a:effectRef>
-      <a:fontRef idx="minor"/>
-    </dgm:style>
-  </dgm:styleLbl>
-  <dgm:styleLbl name="alignAcc1">
-    <dgm:scene3d>
-      <a:camera prst="orthographicFront"/>
-      <a:lightRig rig="threePt" dir="t"/>
-    </dgm:scene3d>
-    <dgm:sp3d/>
-    <dgm:txPr/>
-    <dgm:style>
-      <a:lnRef idx="2">
-        <a:scrgbClr r="0" g="0" b="0"/>
-      </a:lnRef>
-      <a:fillRef idx="1">
-        <a:scrgbClr r="0" g="0" b="0"/>
-      </a:fillRef>
-      <a:effectRef idx="0">
-        <a:scrgbClr r="0" g="0" b="0"/>
-      </a:effectRef>
-      <a:fontRef idx="minor"/>
-    </dgm:style>
-  </dgm:styleLbl>
-  <dgm:styleLbl name="trAlignAcc1">
-    <dgm:scene3d>
-      <a:camera prst="orthographicFront"/>
-      <a:lightRig rig="threePt" dir="t"/>
-    </dgm:scene3d>
-    <dgm:sp3d/>
-    <dgm:txPr/>
-    <dgm:style>
-      <a:lnRef idx="1">
-        <a:scrgbClr r="0" g="0" b="0"/>
-      </a:lnRef>
-      <a:fillRef idx="1">
-        <a:scrgbClr r="0" g="0" b="0"/>
-      </a:fillRef>
-      <a:effectRef idx="0">
-        <a:scrgbClr r="0" g="0" b="0"/>
-      </a:effectRef>
-      <a:fontRef idx="minor"/>
-    </dgm:style>
-  </dgm:styleLbl>
-  <dgm:styleLbl name="bgAcc1">
-    <dgm:scene3d>
-      <a:camera prst="orthographicFront"/>
-      <a:lightRig rig="threePt" dir="t"/>
-    </dgm:scene3d>
-    <dgm:sp3d/>
-    <dgm:txPr/>
-    <dgm:style>
-      <a:lnRef idx="2">
-        <a:scrgbClr r="0" g="0" b="0"/>
-      </a:lnRef>
-      <a:fillRef idx="1">
-        <a:scrgbClr r="0" g="0" b="0"/>
-      </a:fillRef>
-      <a:effectRef idx="0">
-        <a:scrgbClr r="0" g="0" b="0"/>
-      </a:effectRef>
-      <a:fontRef idx="minor"/>
-    </dgm:style>
-  </dgm:styleLbl>
-  <dgm:styleLbl name="solidFgAcc1">
-    <dgm:scene3d>
-      <a:camera prst="orthographicFront"/>
-      <a:lightRig rig="threePt" dir="t"/>
-    </dgm:scene3d>
-    <dgm:sp3d/>
-    <dgm:txPr/>
-    <dgm:style>
-      <a:lnRef idx="2">
-        <a:scrgbClr r="0" g="0" b="0"/>
-      </a:lnRef>
-      <a:fillRef idx="1">
-        <a:scrgbClr r="0" g="0" b="0"/>
-      </a:fillRef>
-      <a:effectRef idx="0">
-        <a:scrgbClr r="0" g="0" b="0"/>
-      </a:effectRef>
-      <a:fontRef idx="minor"/>
-    </dgm:style>
-  </dgm:styleLbl>
-  <dgm:styleLbl name="solidAlignAcc1">
-    <dgm:scene3d>
-      <a:camera prst="orthographicFront"/>
-      <a:lightRig rig="threePt" dir="t"/>
-    </dgm:scene3d>
-    <dgm:sp3d/>
-    <dgm:txPr/>
-    <dgm:style>
-      <a:lnRef idx="2">
-        <a:scrgbClr r="0" g="0" b="0"/>
-      </a:lnRef>
-      <a:fillRef idx="1">
-        <a:scrgbClr r="0" g="0" b="0"/>
-      </a:fillRef>
-      <a:effectRef idx="0">
-        <a:scrgbClr r="0" g="0" b="0"/>
-      </a:effectRef>
-      <a:fontRef idx="minor"/>
-    </dgm:style>
-  </dgm:styleLbl>
-  <dgm:styleLbl name="solidBgAcc1">
-    <dgm:scene3d>
-      <a:camera prst="orthographicFront"/>
-      <a:lightRig rig="threePt" dir="t"/>
-    </dgm:scene3d>
-    <dgm:sp3d/>
-    <dgm:txPr/>
-    <dgm:style>
-      <a:lnRef idx="2">
-        <a:scrgbClr r="0" g="0" b="0"/>
-      </a:lnRef>
-      <a:fillRef idx="1">
-        <a:scrgbClr r="0" g="0" b="0"/>
-      </a:fillRef>
-      <a:effectRef idx="0">
-        <a:scrgbClr r="0" g="0" b="0"/>
-      </a:effectRef>
-      <a:fontRef idx="minor"/>
-    </dgm:style>
-  </dgm:styleLbl>
-  <dgm:styleLbl name="fgAccFollowNode1">
-    <dgm:scene3d>
-      <a:camera prst="orthographicFront"/>
-      <a:lightRig rig="threePt" dir="t"/>
-    </dgm:scene3d>
-    <dgm:sp3d/>
-    <dgm:txPr/>
-    <dgm:style>
-      <a:lnRef idx="2">
-        <a:scrgbClr r="0" g="0" b="0"/>
-      </a:lnRef>
-      <a:fillRef idx="1">
-        <a:scrgbClr r="0" g="0" b="0"/>
-      </a:fillRef>
-      <a:effectRef idx="0">
-        <a:scrgbClr r="0" g="0" b="0"/>
-      </a:effectRef>
-      <a:fontRef idx="minor"/>
-    </dgm:style>
-  </dgm:styleLbl>
-  <dgm:styleLbl name="alignAccFollowNode1">
-    <dgm:scene3d>
-      <a:camera prst="orthographicFront"/>
-      <a:lightRig rig="threePt" dir="t"/>
-    </dgm:scene3d>
-    <dgm:sp3d/>
-    <dgm:txPr/>
-    <dgm:style>
-      <a:lnRef idx="2">
-        <a:scrgbClr r="0" g="0" b="0"/>
-      </a:lnRef>
-      <a:fillRef idx="1">
-        <a:scrgbClr r="0" g="0" b="0"/>
-      </a:fillRef>
-      <a:effectRef idx="0">
-        <a:scrgbClr r="0" g="0" b="0"/>
-      </a:effectRef>
-      <a:fontRef idx="minor"/>
-    </dgm:style>
-  </dgm:styleLbl>
-  <dgm:styleLbl name="bgAccFollowNode1">
-    <dgm:scene3d>
-      <a:camera prst="orthographicFront"/>
-      <a:lightRig rig="threePt" dir="t"/>
-    </dgm:scene3d>
-    <dgm:sp3d/>
-    <dgm:txPr/>
-    <dgm:style>
-      <a:lnRef idx="2">
-        <a:scrgbClr r="0" g="0" b="0"/>
-      </a:lnRef>
-      <a:fillRef idx="1">
-        <a:scrgbClr r="0" g="0" b="0"/>
-      </a:fillRef>
-      <a:effectRef idx="0">
-        <a:scrgbClr r="0" g="0" b="0"/>
-      </a:effectRef>
-      <a:fontRef idx="minor"/>
-    </dgm:style>
-  </dgm:styleLbl>
-  <dgm:styleLbl name="fgAcc0">
-    <dgm:scene3d>
-      <a:camera prst="orthographicFront"/>
-      <a:lightRig rig="threePt" dir="t"/>
-    </dgm:scene3d>
-    <dgm:sp3d/>
-    <dgm:txPr/>
-    <dgm:style>
-      <a:lnRef idx="2">
-        <a:scrgbClr r="0" g="0" b="0"/>
-      </a:lnRef>
-      <a:fillRef idx="1">
-        <a:scrgbClr r="0" g="0" b="0"/>
-      </a:fillRef>
-      <a:effectRef idx="0">
-        <a:scrgbClr r="0" g="0" b="0"/>
-      </a:effectRef>
-      <a:fontRef idx="minor"/>
-    </dgm:style>
-  </dgm:styleLbl>
-  <dgm:styleLbl name="fgAcc2">
-    <dgm:scene3d>
-      <a:camera prst="orthographicFront"/>
-      <a:lightRig rig="threePt" dir="t"/>
-    </dgm:scene3d>
-    <dgm:sp3d/>
-    <dgm:txPr/>
-    <dgm:style>
-      <a:lnRef idx="2">
-        <a:scrgbClr r="0" g="0" b="0"/>
-      </a:lnRef>
-      <a:fillRef idx="1">
-        <a:scrgbClr r="0" g="0" b="0"/>
-      </a:fillRef>
-      <a:effectRef idx="0">
-        <a:scrgbClr r="0" g="0" b="0"/>
-      </a:effectRef>
-      <a:fontRef idx="minor"/>
-    </dgm:style>
-  </dgm:styleLbl>
-  <dgm:styleLbl name="fgAcc3">
-    <dgm:scene3d>
-      <a:camera prst="orthographicFront"/>
-      <a:lightRig rig="threePt" dir="t"/>
-    </dgm:scene3d>
-    <dgm:sp3d/>
-    <dgm:txPr/>
-    <dgm:style>
-      <a:lnRef idx="2">
-        <a:scrgbClr r="0" g="0" b="0"/>
-      </a:lnRef>
-      <a:fillRef idx="1">
-        <a:scrgbClr r="0" g="0" b="0"/>
-      </a:fillRef>
-      <a:effectRef idx="0">
-        <a:scrgbClr r="0" g="0" b="0"/>
-      </a:effectRef>
-      <a:fontRef idx="minor"/>
-    </dgm:style>
-  </dgm:styleLbl>
-  <dgm:styleLbl name="fgAcc4">
-    <dgm:scene3d>
-      <a:camera prst="orthographicFront"/>
-      <a:lightRig rig="threePt" dir="t"/>
-    </dgm:scene3d>
-    <dgm:sp3d/>
-    <dgm:txPr/>
-    <dgm:style>
-      <a:lnRef idx="2">
-        <a:scrgbClr r="0" g="0" b="0"/>
-      </a:lnRef>
-      <a:fillRef idx="1">
-        <a:scrgbClr r="0" g="0" b="0"/>
-      </a:fillRef>
-      <a:effectRef idx="0">
-        <a:scrgbClr r="0" g="0" b="0"/>
-      </a:effectRef>
-      <a:fontRef idx="minor"/>
-    </dgm:style>
-  </dgm:styleLbl>
-  <dgm:styleLbl name="bgShp">
-    <dgm:scene3d>
-      <a:camera prst="orthographicFront"/>
-      <a:lightRig rig="threePt" dir="t"/>
-    </dgm:scene3d>
-    <dgm:sp3d/>
-    <dgm:txPr/>
-    <dgm:style>
-      <a:lnRef idx="0">
-        <a:scrgbClr r="0" g="0" b="0"/>
-      </a:lnRef>
-      <a:fillRef idx="1">
-        <a:scrgbClr r="0" g="0" b="0"/>
-      </a:fillRef>
-      <a:effectRef idx="0">
-        <a:scrgbClr r="0" g="0" b="0"/>
-      </a:effectRef>
-      <a:fontRef idx="minor"/>
-    </dgm:style>
-  </dgm:styleLbl>
-  <dgm:styleLbl name="dkBgShp">
-    <dgm:scene3d>
-      <a:camera prst="orthographicFront"/>
-      <a:lightRig rig="threePt" dir="t"/>
-    </dgm:scene3d>
-    <dgm:sp3d/>
-    <dgm:txPr/>
-    <dgm:style>
-      <a:lnRef idx="0">
-        <a:scrgbClr r="0" g="0" b="0"/>
-      </a:lnRef>
-      <a:fillRef idx="1">
-        <a:scrgbClr r="0" g="0" b="0"/>
-      </a:fillRef>
-      <a:effectRef idx="0">
-        <a:scrgbClr r="0" g="0" b="0"/>
-      </a:effectRef>
-      <a:fontRef idx="minor"/>
-    </dgm:style>
-  </dgm:styleLbl>
-  <dgm:styleLbl name="trBgShp">
-    <dgm:scene3d>
-      <a:camera prst="orthographicFront"/>
-      <a:lightRig rig="threePt" dir="t"/>
-    </dgm:scene3d>
-    <dgm:sp3d/>
-    <dgm:txPr/>
-    <dgm:style>
-      <a:lnRef idx="0">
-        <a:scrgbClr r="0" g="0" b="0"/>
-      </a:lnRef>
-      <a:fillRef idx="1">
-        <a:scrgbClr r="0" g="0" b="0"/>
-      </a:fillRef>
-      <a:effectRef idx="0">
-        <a:scrgbClr r="0" g="0" b="0"/>
-      </a:effectRef>
-      <a:fontRef idx="minor"/>
-    </dgm:style>
-  </dgm:styleLbl>
-  <dgm:styleLbl name="fgShp">
-    <dgm:scene3d>
-      <a:camera prst="orthographicFront"/>
-      <a:lightRig rig="threePt" dir="t"/>
-    </dgm:scene3d>
-    <dgm:sp3d/>
-    <dgm:txPr/>
-    <dgm:style>
-      <a:lnRef idx="2">
-        <a:scrgbClr r="0" g="0" b="0"/>
-      </a:lnRef>
-      <a:fillRef idx="1">
-        <a:scrgbClr r="0" g="0" b="0"/>
-      </a:fillRef>
-      <a:effectRef idx="0">
-        <a:scrgbClr r="0" g="0" b="0"/>
-      </a:effectRef>
-      <a:fontRef idx="minor"/>
-    </dgm:style>
-  </dgm:styleLbl>
-  <dgm:styleLbl name="revTx">
-    <dgm:scene3d>
-      <a:camera prst="orthographicFront"/>
-      <a:lightRig rig="threePt" dir="t"/>
-    </dgm:scene3d>
-    <dgm:sp3d/>
-    <dgm:txPr/>
-    <dgm:style>
-      <a:lnRef idx="0">
-        <a:scrgbClr r="0" g="0" b="0"/>
-      </a:lnRef>
-      <a:fillRef idx="0">
-        <a:scrgbClr r="0" g="0" b="0"/>
-      </a:fillRef>
-      <a:effectRef idx="0">
-        <a:scrgbClr r="0" g="0" b="0"/>
-      </a:effectRef>
-      <a:fontRef idx="minor"/>
-    </dgm:style>
-  </dgm:styleLbl>
-</dgm:styleDef>
 </file>
 
 <file path=ppt/notesMasters/notesMaster1.xml><?xml version="1.0" encoding="utf-8"?>
@@ -3600,150 +601,6 @@
     <p:extLst>
       <p:ext uri="{BB962C8B-B14F-4D97-AF65-F5344CB8AC3E}">
         <p14:creationId xmlns:p14="http://schemas.microsoft.com/office/powerpoint/2010/main" val="3249870097"/>
-      </p:ext>
-    </p:extLst>
-  </p:cSld>
-  <p:clrMapOvr>
-    <a:masterClrMapping/>
-  </p:clrMapOvr>
-</p:notes>
-</file>
-
-<file path=ppt/notesSlides/notesSlide2.xml><?xml version="1.0" encoding="utf-8"?>
-<p:notes xmlns:a="http://schemas.openxmlformats.org/drawingml/2006/main" xmlns:r="http://schemas.openxmlformats.org/officeDocument/2006/relationships" xmlns:p="http://schemas.openxmlformats.org/presentationml/2006/main">
-  <p:cSld>
-    <p:spTree>
-      <p:nvGrpSpPr>
-        <p:cNvPr id="1" name=""/>
-        <p:cNvGrpSpPr/>
-        <p:nvPr/>
-      </p:nvGrpSpPr>
-      <p:grpSpPr>
-        <a:xfrm>
-          <a:off x="0" y="0"/>
-          <a:ext cx="0" cy="0"/>
-          <a:chOff x="0" y="0"/>
-          <a:chExt cx="0" cy="0"/>
-        </a:xfrm>
-      </p:grpSpPr>
-      <p:sp>
-        <p:nvSpPr>
-          <p:cNvPr id="2" name="Slide Image Placeholder 1"/>
-          <p:cNvSpPr>
-            <a:spLocks noGrp="1" noRot="1" noChangeAspect="1"/>
-          </p:cNvSpPr>
-          <p:nvPr>
-            <p:ph type="sldImg"/>
-          </p:nvPr>
-        </p:nvSpPr>
-        <p:spPr/>
-      </p:sp>
-      <p:sp>
-        <p:nvSpPr>
-          <p:cNvPr id="3" name="Notes Placeholder 2"/>
-          <p:cNvSpPr>
-            <a:spLocks noGrp="1"/>
-          </p:cNvSpPr>
-          <p:nvPr>
-            <p:ph type="body" idx="1"/>
-          </p:nvPr>
-        </p:nvSpPr>
-        <p:spPr/>
-        <p:txBody>
-          <a:bodyPr/>
-          <a:lstStyle/>
-          <a:p>
-            <a:endParaRPr lang="en-US" dirty="0"/>
-          </a:p>
-        </p:txBody>
-      </p:sp>
-      <p:sp>
-        <p:nvSpPr>
-          <p:cNvPr id="4" name="Slide Number Placeholder 3"/>
-          <p:cNvSpPr>
-            <a:spLocks noGrp="1"/>
-          </p:cNvSpPr>
-          <p:nvPr>
-            <p:ph type="sldNum" sz="quarter" idx="5"/>
-          </p:nvPr>
-        </p:nvSpPr>
-        <p:spPr/>
-        <p:txBody>
-          <a:bodyPr/>
-          <a:lstStyle/>
-          <a:p>
-            <a:pPr marL="0" marR="0" lvl="0" indent="0" algn="r" defTabSz="914400" rtl="0" eaLnBrk="1" fontAlgn="auto" latinLnBrk="0" hangingPunct="1">
-              <a:lnSpc>
-                <a:spcPct val="100000"/>
-              </a:lnSpc>
-              <a:spcBef>
-                <a:spcPts val="0"/>
-              </a:spcBef>
-              <a:spcAft>
-                <a:spcPts val="0"/>
-              </a:spcAft>
-              <a:buClrTx/>
-              <a:buSzTx/>
-              <a:buFontTx/>
-              <a:buNone/>
-              <a:tabLst/>
-              <a:defRPr/>
-            </a:pPr>
-            <a:fld id="{33AEA074-24A7-4657-AE02-A51F68EA6AA2}" type="slidenum">
-              <a:rPr kumimoji="0" lang="en-US" sz="1200" b="0" i="0" u="none" strike="noStrike" kern="1200" cap="none" spc="0" normalizeH="0" baseline="0" noProof="0" smtClean="0">
-                <a:ln>
-                  <a:noFill/>
-                </a:ln>
-                <a:solidFill>
-                  <a:prstClr val="black"/>
-                </a:solidFill>
-                <a:effectLst/>
-                <a:uLnTx/>
-                <a:uFillTx/>
-                <a:latin typeface="Calibri" panose="020F0502020204030204"/>
-                <a:ea typeface="+mn-ea"/>
-                <a:cs typeface="+mn-cs"/>
-              </a:rPr>
-              <a:pPr marL="0" marR="0" lvl="0" indent="0" algn="r" defTabSz="914400" rtl="0" eaLnBrk="1" fontAlgn="auto" latinLnBrk="0" hangingPunct="1">
-                <a:lnSpc>
-                  <a:spcPct val="100000"/>
-                </a:lnSpc>
-                <a:spcBef>
-                  <a:spcPts val="0"/>
-                </a:spcBef>
-                <a:spcAft>
-                  <a:spcPts val="0"/>
-                </a:spcAft>
-                <a:buClrTx/>
-                <a:buSzTx/>
-                <a:buFontTx/>
-                <a:buNone/>
-                <a:tabLst/>
-                <a:defRPr/>
-              </a:pPr>
-              <a:t>2</a:t>
-            </a:fld>
-            <a:endParaRPr kumimoji="0" lang="en-US" sz="1200" b="0" i="0" u="none" strike="noStrike" kern="1200" cap="none" spc="0" normalizeH="0" baseline="0" noProof="0" dirty="0">
-              <a:ln>
-                <a:noFill/>
-              </a:ln>
-              <a:solidFill>
-                <a:prstClr val="black"/>
-              </a:solidFill>
-              <a:effectLst/>
-              <a:uLnTx/>
-              <a:uFillTx/>
-              <a:latin typeface="Calibri" panose="020F0502020204030204"/>
-              <a:ea typeface="+mn-ea"/>
-              <a:cs typeface="+mn-cs"/>
-            </a:endParaRPr>
-          </a:p>
-        </p:txBody>
-      </p:sp>
-    </p:spTree>
-    <p:extLst>
-      <p:ext uri="{BB962C8B-B14F-4D97-AF65-F5344CB8AC3E}">
-        <p14:creationId xmlns:p14="http://schemas.microsoft.com/office/powerpoint/2010/main" val="3871904880"/>
       </p:ext>
     </p:extLst>
   </p:cSld>
@@ -8112,14 +4969,6 @@
 <file path=ppt/slides/slide2.xml><?xml version="1.0" encoding="utf-8"?>
 <p:sld xmlns:a="http://schemas.openxmlformats.org/drawingml/2006/main" xmlns:r="http://schemas.openxmlformats.org/officeDocument/2006/relationships" xmlns:p="http://schemas.openxmlformats.org/presentationml/2006/main">
   <p:cSld>
-    <p:bg>
-      <p:bgPr>
-        <a:solidFill>
-          <a:schemeClr val="bg1"/>
-        </a:solidFill>
-        <a:effectLst/>
-      </p:bgPr>
-    </p:bg>
     <p:spTree>
       <p:nvGrpSpPr>
         <p:cNvPr id="1" name=""/>
@@ -8139,7 +4988,7 @@
           <p:cNvPr id="2" name="Title 1">
             <a:extLst>
               <a:ext uri="{FF2B5EF4-FFF2-40B4-BE49-F238E27FC236}">
-                <a16:creationId xmlns:a16="http://schemas.microsoft.com/office/drawing/2014/main" id="{66A47F5C-50EC-416A-AE8C-6F6BB4225673}"/>
+                <a16:creationId xmlns:a16="http://schemas.microsoft.com/office/drawing/2014/main" id="{232A2452-BACE-4578-BCFC-630C42CEEB2B}"/>
               </a:ext>
             </a:extLst>
           </p:cNvPr>
@@ -8150,12 +4999,169 @@
             <p:ph type="title"/>
           </p:nvPr>
         </p:nvSpPr>
-        <p:spPr>
-          <a:xfrm>
-            <a:off x="1097280" y="286603"/>
-            <a:ext cx="10058400" cy="1450757"/>
-          </a:xfrm>
-        </p:spPr>
+        <p:spPr/>
+        <p:txBody>
+          <a:bodyPr/>
+          <a:lstStyle/>
+          <a:p>
+            <a:r>
+              <a:rPr lang="en-US" dirty="0"/>
+              <a:t>The need</a:t>
+            </a:r>
+            <a:endParaRPr lang="en-AU" dirty="0"/>
+          </a:p>
+        </p:txBody>
+      </p:sp>
+      <p:sp>
+        <p:nvSpPr>
+          <p:cNvPr id="3" name="Content Placeholder 2">
+            <a:extLst>
+              <a:ext uri="{FF2B5EF4-FFF2-40B4-BE49-F238E27FC236}">
+                <a16:creationId xmlns:a16="http://schemas.microsoft.com/office/drawing/2014/main" id="{E8D24D81-74A1-4320-9FD2-ECE4CE2E8FB5}"/>
+              </a:ext>
+            </a:extLst>
+          </p:cNvPr>
+          <p:cNvSpPr>
+            <a:spLocks noGrp="1"/>
+          </p:cNvSpPr>
+          <p:nvPr>
+            <p:ph idx="1"/>
+          </p:nvPr>
+        </p:nvSpPr>
+        <p:spPr/>
+        <p:txBody>
+          <a:bodyPr/>
+          <a:lstStyle/>
+          <a:p>
+            <a:r>
+              <a:rPr lang="en-US" dirty="0"/>
+              <a:t>World is getting smaller</a:t>
+            </a:r>
+          </a:p>
+          <a:p>
+            <a:r>
+              <a:rPr lang="en-US" dirty="0"/>
+              <a:t>Don’t need to limit our searches to our local area</a:t>
+            </a:r>
+          </a:p>
+          <a:p>
+            <a:r>
+              <a:rPr lang="en-US" dirty="0"/>
+              <a:t>Travel is cheap</a:t>
+            </a:r>
+          </a:p>
+          <a:p>
+            <a:r>
+              <a:rPr lang="en-US" dirty="0"/>
+              <a:t>Niche groups (childfree, no-marriage) difficulty finding similar people in small area, are more willing to relocate to find what they want</a:t>
+            </a:r>
+          </a:p>
+          <a:p>
+            <a:r>
+              <a:rPr lang="en-US" dirty="0"/>
+              <a:t>Many jobs are remote now, meaning more travelers, and people willing to relocate for a partner</a:t>
+            </a:r>
+          </a:p>
+          <a:p>
+            <a:endParaRPr lang="en-US" dirty="0"/>
+          </a:p>
+          <a:p>
+            <a:r>
+              <a:rPr lang="en-US" dirty="0"/>
+              <a:t>Existing apps (Tinder, Bumble, etc.) quite expensive for global swiping</a:t>
+            </a:r>
+          </a:p>
+          <a:p>
+            <a:r>
+              <a:rPr lang="en-US" dirty="0"/>
+              <a:t>You need to keep changing your location when you want to swipe somewhere new</a:t>
+            </a:r>
+          </a:p>
+          <a:p>
+            <a:r>
+              <a:rPr lang="en-US" dirty="0"/>
+              <a:t>Their model is based on local area, not global</a:t>
+            </a:r>
+            <a:endParaRPr lang="en-AU" dirty="0"/>
+          </a:p>
+        </p:txBody>
+      </p:sp>
+    </p:spTree>
+    <p:extLst>
+      <p:ext uri="{BB962C8B-B14F-4D97-AF65-F5344CB8AC3E}">
+        <p14:creationId xmlns:p14="http://schemas.microsoft.com/office/powerpoint/2010/main" val="117106058"/>
+      </p:ext>
+    </p:extLst>
+  </p:cSld>
+  <p:clrMapOvr>
+    <a:masterClrMapping/>
+  </p:clrMapOvr>
+</p:sld>
+</file>
+
+<file path=ppt/slides/slide3.xml><?xml version="1.0" encoding="utf-8"?>
+<p:sld xmlns:a="http://schemas.openxmlformats.org/drawingml/2006/main" xmlns:r="http://schemas.openxmlformats.org/officeDocument/2006/relationships" xmlns:p="http://schemas.openxmlformats.org/presentationml/2006/main">
+  <p:cSld>
+    <p:spTree>
+      <p:nvGrpSpPr>
+        <p:cNvPr id="1" name=""/>
+        <p:cNvGrpSpPr/>
+        <p:nvPr/>
+      </p:nvGrpSpPr>
+      <p:grpSpPr>
+        <a:xfrm>
+          <a:off x="0" y="0"/>
+          <a:ext cx="0" cy="0"/>
+          <a:chOff x="0" y="0"/>
+          <a:chExt cx="0" cy="0"/>
+        </a:xfrm>
+      </p:grpSpPr>
+      <p:sp>
+        <p:nvSpPr>
+          <p:cNvPr id="2" name="Title 1">
+            <a:extLst>
+              <a:ext uri="{FF2B5EF4-FFF2-40B4-BE49-F238E27FC236}">
+                <a16:creationId xmlns:a16="http://schemas.microsoft.com/office/drawing/2014/main" id="{03B84902-A369-44CC-A091-768D0838B3DB}"/>
+              </a:ext>
+            </a:extLst>
+          </p:cNvPr>
+          <p:cNvSpPr>
+            <a:spLocks noGrp="1"/>
+          </p:cNvSpPr>
+          <p:nvPr>
+            <p:ph type="title"/>
+          </p:nvPr>
+        </p:nvSpPr>
+        <p:spPr/>
+        <p:txBody>
+          <a:bodyPr/>
+          <a:lstStyle/>
+          <a:p>
+            <a:r>
+              <a:rPr lang="en-US" dirty="0"/>
+              <a:t>Walkthrough</a:t>
+            </a:r>
+            <a:endParaRPr lang="en-AU" dirty="0"/>
+          </a:p>
+        </p:txBody>
+      </p:sp>
+      <p:sp>
+        <p:nvSpPr>
+          <p:cNvPr id="3" name="Content Placeholder 2">
+            <a:extLst>
+              <a:ext uri="{FF2B5EF4-FFF2-40B4-BE49-F238E27FC236}">
+                <a16:creationId xmlns:a16="http://schemas.microsoft.com/office/drawing/2014/main" id="{50A25815-EA6F-4D21-89D0-178680EE2D53}"/>
+              </a:ext>
+            </a:extLst>
+          </p:cNvPr>
+          <p:cNvSpPr>
+            <a:spLocks noGrp="1"/>
+          </p:cNvSpPr>
+          <p:nvPr>
+            <p:ph idx="1"/>
+          </p:nvPr>
+        </p:nvSpPr>
+        <p:spPr/>
         <p:txBody>
           <a:bodyPr>
             <a:normAutofit/>
@@ -8163,47 +5169,75 @@
           <a:lstStyle/>
           <a:p>
             <a:r>
-              <a:rPr lang="en-US" dirty="0"/>
-              <a:t>Title Lorem Ipsum </a:t>
-            </a:r>
-          </a:p>
-        </p:txBody>
-      </p:sp>
-      <p:graphicFrame>
-        <p:nvGraphicFramePr>
-          <p:cNvPr id="4" name="Content Placeholder 2" descr="SmartArt graphic">
-            <a:extLst>
-              <a:ext uri="{FF2B5EF4-FFF2-40B4-BE49-F238E27FC236}">
-                <a16:creationId xmlns:a16="http://schemas.microsoft.com/office/drawing/2014/main" id="{59F5A1AC-D08D-42AE-B94A-1CAFB517D846}"/>
-              </a:ext>
-            </a:extLst>
-          </p:cNvPr>
-          <p:cNvGraphicFramePr>
-            <a:graphicFrameLocks noGrp="1"/>
-          </p:cNvGraphicFramePr>
-          <p:nvPr>
-            <p:ph idx="1"/>
-            <p:extLst>
-              <p:ext uri="{D42A27DB-BD31-4B8C-83A1-F6EECF244321}">
-                <p14:modId xmlns:p14="http://schemas.microsoft.com/office/powerpoint/2010/main" val="3636344063"/>
-              </p:ext>
-            </p:extLst>
-          </p:nvPr>
-        </p:nvGraphicFramePr>
-        <p:xfrm>
-          <a:off x="1096963" y="2098515"/>
-          <a:ext cx="10058400" cy="3786080"/>
-        </p:xfrm>
-        <a:graphic>
-          <a:graphicData uri="http://schemas.openxmlformats.org/drawingml/2006/diagram">
-            <dgm:relIds xmlns:dgm="http://schemas.openxmlformats.org/drawingml/2006/diagram" xmlns:r="http://schemas.openxmlformats.org/officeDocument/2006/relationships" r:dm="rId4" r:lo="rId5" r:qs="rId6" r:cs="rId7"/>
-          </a:graphicData>
-        </a:graphic>
-      </p:graphicFrame>
+              <a:rPr lang="en-US" sz="1600" dirty="0"/>
+              <a:t>Features</a:t>
+            </a:r>
+          </a:p>
+          <a:p>
+            <a:r>
+              <a:rPr lang="en-US" sz="1600" dirty="0"/>
+              <a:t>User sign up</a:t>
+            </a:r>
+          </a:p>
+          <a:p>
+            <a:r>
+              <a:rPr lang="en-US" sz="1600" dirty="0"/>
+              <a:t>Create profile</a:t>
+            </a:r>
+          </a:p>
+          <a:p>
+            <a:pPr lvl="1"/>
+            <a:r>
+              <a:rPr lang="en-US" sz="1600" dirty="0"/>
+              <a:t>Attach photos</a:t>
+            </a:r>
+          </a:p>
+          <a:p>
+            <a:pPr lvl="1"/>
+            <a:r>
+              <a:rPr lang="en-US" sz="1600" dirty="0"/>
+              <a:t>Edit details</a:t>
+            </a:r>
+          </a:p>
+          <a:p>
+            <a:r>
+              <a:rPr lang="en-US" sz="1600" dirty="0"/>
+              <a:t>Advanced Search</a:t>
+            </a:r>
+          </a:p>
+          <a:p>
+            <a:pPr lvl="1"/>
+            <a:r>
+              <a:rPr lang="en-US" sz="1600" dirty="0"/>
+              <a:t>Can specify 1 or many criteria</a:t>
+            </a:r>
+          </a:p>
+          <a:p>
+            <a:r>
+              <a:rPr lang="en-US" sz="1600" dirty="0"/>
+              <a:t>Premium membership</a:t>
+            </a:r>
+          </a:p>
+          <a:p>
+            <a:pPr lvl="1"/>
+            <a:r>
+              <a:rPr lang="en-US" sz="1600" dirty="0"/>
+              <a:t>Can only message other users when you are a premium member</a:t>
+            </a:r>
+          </a:p>
+          <a:p>
+            <a:r>
+              <a:rPr lang="en-US" sz="1600" dirty="0"/>
+              <a:t>Contact us form</a:t>
+            </a:r>
+            <a:endParaRPr lang="en-AU" sz="1600" dirty="0"/>
+          </a:p>
+        </p:txBody>
+      </p:sp>
     </p:spTree>
     <p:extLst>
       <p:ext uri="{BB962C8B-B14F-4D97-AF65-F5344CB8AC3E}">
-        <p14:creationId xmlns:p14="http://schemas.microsoft.com/office/powerpoint/2010/main" val="3192257811"/>
+        <p14:creationId xmlns:p14="http://schemas.microsoft.com/office/powerpoint/2010/main" val="2605241575"/>
       </p:ext>
     </p:extLst>
   </p:cSld>
@@ -8827,49 +5861,6 @@
 </a:themeOverride>
 </file>
 
-<file path=ppt/theme/themeOverride2.xml><?xml version="1.0" encoding="utf-8"?>
-<a:themeOverride xmlns:a="http://schemas.openxmlformats.org/drawingml/2006/main">
-  <a:clrScheme name="Custom 46">
-    <a:dk1>
-      <a:sysClr val="windowText" lastClr="000000"/>
-    </a:dk1>
-    <a:lt1>
-      <a:sysClr val="window" lastClr="FFFFFF"/>
-    </a:lt1>
-    <a:dk2>
-      <a:srgbClr val="121316"/>
-    </a:dk2>
-    <a:lt2>
-      <a:srgbClr val="FEFCF7"/>
-    </a:lt2>
-    <a:accent1>
-      <a:srgbClr val="8394A4"/>
-    </a:accent1>
-    <a:accent2>
-      <a:srgbClr val="65739F"/>
-    </a:accent2>
-    <a:accent3>
-      <a:srgbClr val="B2AC8A"/>
-    </a:accent3>
-    <a:accent4>
-      <a:srgbClr val="879BB3"/>
-    </a:accent4>
-    <a:accent5>
-      <a:srgbClr val="D7B579"/>
-    </a:accent5>
-    <a:accent6>
-      <a:srgbClr val="8A9B89"/>
-    </a:accent6>
-    <a:hlink>
-      <a:srgbClr val="85C4D2"/>
-    </a:hlink>
-    <a:folHlink>
-      <a:srgbClr val="8E8CA7"/>
-    </a:folHlink>
-  </a:clrScheme>
-</a:themeOverride>
-</file>
-
 <file path=customXml/item1.xml><?xml version="1.0" encoding="utf-8"?>
 <?mso-contentType ?>
 <FormTemplates xmlns="http://schemas.microsoft.com/sharepoint/v3/contenttype/forms">

</xml_diff>